<commit_message>
Atualização do slide da apresentação. Correção da WBS.
</commit_message>
<xml_diff>
--- a/GPS_2014_Modelo de Apresentação_Entrega 2.pptx
+++ b/GPS_2014_Modelo de Apresentação_Entrega 2.pptx
@@ -5,7 +5,7 @@
     <p:sldMasterId id="2147483648" r:id="rId1"/>
   </p:sldMasterIdLst>
   <p:notesMasterIdLst>
-    <p:notesMasterId r:id="rId17"/>
+    <p:notesMasterId r:id="rId18"/>
   </p:notesMasterIdLst>
   <p:sldIdLst>
     <p:sldId id="259" r:id="rId2"/>
@@ -22,7 +22,8 @@
     <p:sldId id="291" r:id="rId13"/>
     <p:sldId id="293" r:id="rId14"/>
     <p:sldId id="295" r:id="rId15"/>
-    <p:sldId id="279" r:id="rId16"/>
+    <p:sldId id="318" r:id="rId16"/>
+    <p:sldId id="279" r:id="rId17"/>
   </p:sldIdLst>
   <p:sldSz cx="9144000" cy="6858000" type="screen4x3"/>
   <p:notesSz cx="7315200" cy="9601200"/>
@@ -222,7 +223,7 @@
           <a:p>
             <a:fld id="{D77B3AC6-9B44-4B5C-8B25-D3008DB399E3}" type="datetimeFigureOut">
               <a:rPr lang="pt-BR" smtClean="0"/>
-              <a:t>06/04/2015</a:t>
+              <a:t>07/04/2015</a:t>
             </a:fld>
             <a:endParaRPr lang="pt-BR"/>
           </a:p>
@@ -381,7 +382,7 @@
           <a:p>
             <a:fld id="{ECB4F886-580C-4471-933D-84EA2AD852AB}" type="slidenum">
               <a:rPr lang="pt-BR" smtClean="0"/>
-              <a:t>‹#›</a:t>
+              <a:t>‹nº›</a:t>
             </a:fld>
             <a:endParaRPr lang="pt-BR"/>
           </a:p>
@@ -1206,7 +1207,7 @@
             <a:fld id="{94CDC042-039A-4E80-A826-4614F83E09D2}" type="datetimeFigureOut">
               <a:rPr lang="pt-BR" smtClean="0"/>
               <a:pPr/>
-              <a:t>06/04/2015</a:t>
+              <a:t>07/04/2015</a:t>
             </a:fld>
             <a:endParaRPr lang="pt-BR"/>
           </a:p>
@@ -1249,7 +1250,7 @@
             <a:fld id="{FD633073-5C0F-4B13-B3E3-2ADA7DBEA4A8}" type="slidenum">
               <a:rPr lang="pt-BR" smtClean="0"/>
               <a:pPr/>
-              <a:t>‹#›</a:t>
+              <a:t>‹nº›</a:t>
             </a:fld>
             <a:endParaRPr lang="pt-BR"/>
           </a:p>
@@ -1378,7 +1379,7 @@
             <a:fld id="{94CDC042-039A-4E80-A826-4614F83E09D2}" type="datetimeFigureOut">
               <a:rPr lang="pt-BR" smtClean="0"/>
               <a:pPr/>
-              <a:t>06/04/2015</a:t>
+              <a:t>07/04/2015</a:t>
             </a:fld>
             <a:endParaRPr lang="pt-BR"/>
           </a:p>
@@ -1421,7 +1422,7 @@
             <a:fld id="{FD633073-5C0F-4B13-B3E3-2ADA7DBEA4A8}" type="slidenum">
               <a:rPr lang="pt-BR" smtClean="0"/>
               <a:pPr/>
-              <a:t>‹#›</a:t>
+              <a:t>‹nº›</a:t>
             </a:fld>
             <a:endParaRPr lang="pt-BR"/>
           </a:p>
@@ -1560,7 +1561,7 @@
             <a:fld id="{94CDC042-039A-4E80-A826-4614F83E09D2}" type="datetimeFigureOut">
               <a:rPr lang="pt-BR" smtClean="0"/>
               <a:pPr/>
-              <a:t>06/04/2015</a:t>
+              <a:t>07/04/2015</a:t>
             </a:fld>
             <a:endParaRPr lang="pt-BR"/>
           </a:p>
@@ -1603,7 +1604,7 @@
             <a:fld id="{FD633073-5C0F-4B13-B3E3-2ADA7DBEA4A8}" type="slidenum">
               <a:rPr lang="pt-BR" smtClean="0"/>
               <a:pPr/>
-              <a:t>‹#›</a:t>
+              <a:t>‹nº›</a:t>
             </a:fld>
             <a:endParaRPr lang="pt-BR"/>
           </a:p>
@@ -1773,7 +1774,7 @@
             <a:fld id="{94CDC042-039A-4E80-A826-4614F83E09D2}" type="datetimeFigureOut">
               <a:rPr lang="pt-BR" smtClean="0"/>
               <a:pPr/>
-              <a:t>06/04/2015</a:t>
+              <a:t>07/04/2015</a:t>
             </a:fld>
             <a:endParaRPr lang="pt-BR"/>
           </a:p>
@@ -1816,7 +1817,7 @@
             <a:fld id="{FD633073-5C0F-4B13-B3E3-2ADA7DBEA4A8}" type="slidenum">
               <a:rPr lang="pt-BR" smtClean="0"/>
               <a:pPr/>
-              <a:t>‹#›</a:t>
+              <a:t>‹nº›</a:t>
             </a:fld>
             <a:endParaRPr lang="pt-BR"/>
           </a:p>
@@ -2021,7 +2022,7 @@
             <a:fld id="{94CDC042-039A-4E80-A826-4614F83E09D2}" type="datetimeFigureOut">
               <a:rPr lang="pt-BR" smtClean="0"/>
               <a:pPr/>
-              <a:t>06/04/2015</a:t>
+              <a:t>07/04/2015</a:t>
             </a:fld>
             <a:endParaRPr lang="pt-BR"/>
           </a:p>
@@ -2064,7 +2065,7 @@
             <a:fld id="{FD633073-5C0F-4B13-B3E3-2ADA7DBEA4A8}" type="slidenum">
               <a:rPr lang="pt-BR" smtClean="0"/>
               <a:pPr/>
-              <a:t>‹#›</a:t>
+              <a:t>‹nº›</a:t>
             </a:fld>
             <a:endParaRPr lang="pt-BR"/>
           </a:p>
@@ -2311,7 +2312,7 @@
             <a:fld id="{94CDC042-039A-4E80-A826-4614F83E09D2}" type="datetimeFigureOut">
               <a:rPr lang="pt-BR" smtClean="0"/>
               <a:pPr/>
-              <a:t>06/04/2015</a:t>
+              <a:t>07/04/2015</a:t>
             </a:fld>
             <a:endParaRPr lang="pt-BR"/>
           </a:p>
@@ -2354,7 +2355,7 @@
             <a:fld id="{FD633073-5C0F-4B13-B3E3-2ADA7DBEA4A8}" type="slidenum">
               <a:rPr lang="pt-BR" smtClean="0"/>
               <a:pPr/>
-              <a:t>‹#›</a:t>
+              <a:t>‹nº›</a:t>
             </a:fld>
             <a:endParaRPr lang="pt-BR"/>
           </a:p>
@@ -2735,7 +2736,7 @@
             <a:fld id="{94CDC042-039A-4E80-A826-4614F83E09D2}" type="datetimeFigureOut">
               <a:rPr lang="pt-BR" smtClean="0"/>
               <a:pPr/>
-              <a:t>06/04/2015</a:t>
+              <a:t>07/04/2015</a:t>
             </a:fld>
             <a:endParaRPr lang="pt-BR"/>
           </a:p>
@@ -2778,7 +2779,7 @@
             <a:fld id="{FD633073-5C0F-4B13-B3E3-2ADA7DBEA4A8}" type="slidenum">
               <a:rPr lang="pt-BR" smtClean="0"/>
               <a:pPr/>
-              <a:t>‹#›</a:t>
+              <a:t>‹nº›</a:t>
             </a:fld>
             <a:endParaRPr lang="pt-BR"/>
           </a:p>
@@ -2855,7 +2856,7 @@
             <a:fld id="{94CDC042-039A-4E80-A826-4614F83E09D2}" type="datetimeFigureOut">
               <a:rPr lang="pt-BR" smtClean="0"/>
               <a:pPr/>
-              <a:t>06/04/2015</a:t>
+              <a:t>07/04/2015</a:t>
             </a:fld>
             <a:endParaRPr lang="pt-BR"/>
           </a:p>
@@ -2898,7 +2899,7 @@
             <a:fld id="{FD633073-5C0F-4B13-B3E3-2ADA7DBEA4A8}" type="slidenum">
               <a:rPr lang="pt-BR" smtClean="0"/>
               <a:pPr/>
-              <a:t>‹#›</a:t>
+              <a:t>‹nº›</a:t>
             </a:fld>
             <a:endParaRPr lang="pt-BR"/>
           </a:p>
@@ -2952,7 +2953,7 @@
             <a:fld id="{94CDC042-039A-4E80-A826-4614F83E09D2}" type="datetimeFigureOut">
               <a:rPr lang="pt-BR" smtClean="0"/>
               <a:pPr/>
-              <a:t>06/04/2015</a:t>
+              <a:t>07/04/2015</a:t>
             </a:fld>
             <a:endParaRPr lang="pt-BR"/>
           </a:p>
@@ -2995,7 +2996,7 @@
             <a:fld id="{FD633073-5C0F-4B13-B3E3-2ADA7DBEA4A8}" type="slidenum">
               <a:rPr lang="pt-BR" smtClean="0"/>
               <a:pPr/>
-              <a:t>‹#›</a:t>
+              <a:t>‹nº›</a:t>
             </a:fld>
             <a:endParaRPr lang="pt-BR"/>
           </a:p>
@@ -3231,7 +3232,7 @@
             <a:fld id="{94CDC042-039A-4E80-A826-4614F83E09D2}" type="datetimeFigureOut">
               <a:rPr lang="pt-BR" smtClean="0"/>
               <a:pPr/>
-              <a:t>06/04/2015</a:t>
+              <a:t>07/04/2015</a:t>
             </a:fld>
             <a:endParaRPr lang="pt-BR"/>
           </a:p>
@@ -3274,7 +3275,7 @@
             <a:fld id="{FD633073-5C0F-4B13-B3E3-2ADA7DBEA4A8}" type="slidenum">
               <a:rPr lang="pt-BR" smtClean="0"/>
               <a:pPr/>
-              <a:t>‹#›</a:t>
+              <a:t>‹nº›</a:t>
             </a:fld>
             <a:endParaRPr lang="pt-BR"/>
           </a:p>
@@ -3486,7 +3487,7 @@
             <a:fld id="{94CDC042-039A-4E80-A826-4614F83E09D2}" type="datetimeFigureOut">
               <a:rPr lang="pt-BR" smtClean="0"/>
               <a:pPr/>
-              <a:t>06/04/2015</a:t>
+              <a:t>07/04/2015</a:t>
             </a:fld>
             <a:endParaRPr lang="pt-BR"/>
           </a:p>
@@ -3529,7 +3530,7 @@
             <a:fld id="{FD633073-5C0F-4B13-B3E3-2ADA7DBEA4A8}" type="slidenum">
               <a:rPr lang="pt-BR" smtClean="0"/>
               <a:pPr/>
-              <a:t>‹#›</a:t>
+              <a:t>‹nº›</a:t>
             </a:fld>
             <a:endParaRPr lang="pt-BR"/>
           </a:p>
@@ -3701,7 +3702,7 @@
             <a:fld id="{94CDC042-039A-4E80-A826-4614F83E09D2}" type="datetimeFigureOut">
               <a:rPr lang="pt-BR" smtClean="0"/>
               <a:pPr/>
-              <a:t>06/04/2015</a:t>
+              <a:t>07/04/2015</a:t>
             </a:fld>
             <a:endParaRPr lang="pt-BR"/>
           </a:p>
@@ -3780,7 +3781,7 @@
             <a:fld id="{FD633073-5C0F-4B13-B3E3-2ADA7DBEA4A8}" type="slidenum">
               <a:rPr lang="pt-BR" smtClean="0"/>
               <a:pPr/>
-              <a:t>‹#›</a:t>
+              <a:t>‹nº›</a:t>
             </a:fld>
             <a:endParaRPr lang="pt-BR"/>
           </a:p>
@@ -4291,6 +4292,9 @@
   <p:clrMapOvr>
     <a:masterClrMapping/>
   </p:clrMapOvr>
+  <p:transition spd="slow">
+    <p:push dir="u"/>
+  </p:transition>
   <p:timing>
     <p:tnLst>
       <p:par>
@@ -4450,6 +4454,18 @@
   <p:clrMapOvr>
     <a:masterClrMapping/>
   </p:clrMapOvr>
+  <mc:AlternateContent xmlns:mc="http://schemas.openxmlformats.org/markup-compatibility/2006">
+    <mc:Choice xmlns:p14="http://schemas.microsoft.com/office/powerpoint/2010/main" Requires="p14">
+      <p:transition spd="slow" p14:dur="1500">
+        <p:split orient="vert"/>
+      </p:transition>
+    </mc:Choice>
+    <mc:Fallback>
+      <p:transition spd="slow">
+        <p:split orient="vert"/>
+      </p:transition>
+    </mc:Fallback>
+  </mc:AlternateContent>
   <p:timing>
     <p:tnLst>
       <p:par>
@@ -4603,6 +4619,9 @@
   <p:clrMapOvr>
     <a:masterClrMapping/>
   </p:clrMapOvr>
+  <p:transition spd="slow">
+    <p:cover dir="u"/>
+  </p:transition>
   <p:timing>
     <p:tnLst>
       <p:par>
@@ -4801,6 +4820,9 @@
   <p:clrMapOvr>
     <a:masterClrMapping/>
   </p:clrMapOvr>
+  <p:transition spd="slow">
+    <p:cover dir="u"/>
+  </p:transition>
   <p:timing>
     <p:tnLst>
       <p:par>
@@ -4911,7 +4933,7 @@
         <p:spPr>
           <a:xfrm>
             <a:off x="5280600" y="1105128"/>
-            <a:ext cx="3863400" cy="1015663"/>
+            <a:ext cx="3863400" cy="707886"/>
           </a:xfrm>
           <a:prstGeom prst="rect">
             <a:avLst/>
@@ -4937,8 +4959,21 @@
                   <a:srgbClr val="FF0000"/>
                 </a:solidFill>
               </a:rPr>
-              <a:t>Os casos de uso do gestor podem ser melhor visualizados nos slides anterior.</a:t>
-            </a:r>
+              <a:t>Os casos de uso do gestor podem ser </a:t>
+            </a:r>
+            <a:r>
+              <a:rPr lang="pt-BR" sz="2000" dirty="0" smtClean="0">
+                <a:solidFill>
+                  <a:srgbClr val="FF0000"/>
+                </a:solidFill>
+              </a:rPr>
+              <a:t>visualizados no slide anterior.</a:t>
+            </a:r>
+            <a:endParaRPr lang="pt-BR" sz="2000" dirty="0">
+              <a:solidFill>
+                <a:srgbClr val="FF0000"/>
+              </a:solidFill>
+            </a:endParaRPr>
           </a:p>
         </p:txBody>
       </p:sp>
@@ -4994,6 +5029,9 @@
   <p:clrMapOvr>
     <a:masterClrMapping/>
   </p:clrMapOvr>
+  <p:transition spd="slow">
+    <p:cover dir="u"/>
+  </p:transition>
   <p:timing>
     <p:tnLst>
       <p:par>
@@ -5109,7 +5147,7 @@
       </p:sp>
       <p:pic>
         <p:nvPicPr>
-          <p:cNvPr id="5" name="Imagem 2"/>
+          <p:cNvPr id="2" name="Imagem 1"/>
           <p:cNvPicPr>
             <a:picLocks noChangeAspect="1"/>
           </p:cNvPicPr>
@@ -5129,14 +5167,64 @@
         </p:blipFill>
         <p:spPr>
           <a:xfrm>
-            <a:off x="0" y="1417638"/>
-            <a:ext cx="9144000" cy="4694418"/>
+            <a:off x="11019" y="1412776"/>
+            <a:ext cx="9132981" cy="4688760"/>
           </a:xfrm>
           <a:prstGeom prst="rect">
             <a:avLst/>
           </a:prstGeom>
         </p:spPr>
       </p:pic>
+      <p:sp>
+        <p:nvSpPr>
+          <p:cNvPr id="6" name="Retângulo 5"/>
+          <p:cNvSpPr/>
+          <p:nvPr/>
+        </p:nvSpPr>
+        <p:spPr>
+          <a:xfrm>
+            <a:off x="503548" y="6076736"/>
+            <a:ext cx="8136904" cy="400110"/>
+          </a:xfrm>
+          <a:prstGeom prst="rect">
+            <a:avLst/>
+          </a:prstGeom>
+        </p:spPr>
+        <p:txBody>
+          <a:bodyPr wrap="square">
+            <a:spAutoFit/>
+          </a:bodyPr>
+          <a:lstStyle/>
+          <a:p>
+            <a:pPr>
+              <a:buClr>
+                <a:schemeClr val="bg2"/>
+              </a:buClr>
+            </a:pPr>
+            <a:r>
+              <a:rPr lang="pt-BR" sz="2000" dirty="0" smtClean="0">
+                <a:solidFill>
+                  <a:srgbClr val="FF0000"/>
+                </a:solidFill>
+              </a:rPr>
+              <a:t>*</a:t>
+            </a:r>
+            <a:r>
+              <a:rPr lang="pt-BR" sz="2000" dirty="0" smtClean="0">
+                <a:solidFill>
+                  <a:srgbClr val="FF0000"/>
+                </a:solidFill>
+              </a:rPr>
+              <a:t>O banco de dados ainda não foi finalizado e terá modificações</a:t>
+            </a:r>
+            <a:endParaRPr lang="pt-BR" sz="2000" dirty="0">
+              <a:solidFill>
+                <a:srgbClr val="FF0000"/>
+              </a:solidFill>
+            </a:endParaRPr>
+          </a:p>
+        </p:txBody>
+      </p:sp>
     </p:spTree>
     <p:extLst>
       <p:ext uri="{BB962C8B-B14F-4D97-AF65-F5344CB8AC3E}">
@@ -5147,6 +5235,18 @@
   <p:clrMapOvr>
     <a:masterClrMapping/>
   </p:clrMapOvr>
+  <mc:AlternateContent xmlns:mc="http://schemas.openxmlformats.org/markup-compatibility/2006">
+    <mc:Choice xmlns:p15="http://schemas.microsoft.com/office/powerpoint/2012/main" Requires="p15">
+      <p:transition xmlns:p14="http://schemas.microsoft.com/office/powerpoint/2010/main" spd="slow" p14:dur="1250">
+        <p15:prstTrans prst="airplane"/>
+      </p:transition>
+    </mc:Choice>
+    <mc:Fallback>
+      <p:transition spd="slow">
+        <p:fade/>
+      </p:transition>
+    </mc:Fallback>
+  </mc:AlternateContent>
   <p:timing>
     <p:tnLst>
       <p:par>
@@ -5174,6 +5274,87 @@
           <a:chExt cx="0" cy="0"/>
         </a:xfrm>
       </p:grpSpPr>
+      <p:pic>
+        <p:nvPicPr>
+          <p:cNvPr id="4" name="Imagem 3">
+            <a:hlinkClick r:id="rId2"/>
+          </p:cNvPr>
+          <p:cNvPicPr>
+            <a:picLocks noChangeAspect="1"/>
+          </p:cNvPicPr>
+          <p:nvPr/>
+        </p:nvPicPr>
+        <p:blipFill>
+          <a:blip r:embed="rId3">
+            <a:extLst>
+              <a:ext uri="{28A0092B-C50C-407E-A947-70E740481C1C}">
+                <a14:useLocalDpi xmlns:a14="http://schemas.microsoft.com/office/drawing/2010/main" val="0"/>
+              </a:ext>
+            </a:extLst>
+          </a:blip>
+          <a:stretch>
+            <a:fillRect/>
+          </a:stretch>
+        </p:blipFill>
+        <p:spPr>
+          <a:xfrm>
+            <a:off x="1403648" y="836712"/>
+            <a:ext cx="6630745" cy="5169225"/>
+          </a:xfrm>
+          <a:prstGeom prst="rect">
+            <a:avLst/>
+          </a:prstGeom>
+        </p:spPr>
+      </p:pic>
+    </p:spTree>
+    <p:extLst>
+      <p:ext uri="{BB962C8B-B14F-4D97-AF65-F5344CB8AC3E}">
+        <p14:creationId xmlns:p14="http://schemas.microsoft.com/office/powerpoint/2010/main" val="270374617"/>
+      </p:ext>
+    </p:extLst>
+  </p:cSld>
+  <p:clrMapOvr>
+    <a:masterClrMapping/>
+  </p:clrMapOvr>
+  <mc:AlternateContent xmlns:mc="http://schemas.openxmlformats.org/markup-compatibility/2006">
+    <mc:Choice xmlns:p14="http://schemas.microsoft.com/office/powerpoint/2010/main" Requires="p14">
+      <p:transition spd="slow" p14:dur="1200">
+        <p:dissolve/>
+      </p:transition>
+    </mc:Choice>
+    <mc:Fallback>
+      <p:transition spd="slow">
+        <p:dissolve/>
+      </p:transition>
+    </mc:Fallback>
+  </mc:AlternateContent>
+  <p:timing>
+    <p:tnLst>
+      <p:par>
+        <p:cTn id="1" dur="indefinite" restart="never" nodeType="tmRoot"/>
+      </p:par>
+    </p:tnLst>
+  </p:timing>
+</p:sld>
+</file>
+
+<file path=ppt/slides/slide16.xml><?xml version="1.0" encoding="utf-8"?>
+<p:sld xmlns:a="http://schemas.openxmlformats.org/drawingml/2006/main" xmlns:r="http://schemas.openxmlformats.org/officeDocument/2006/relationships" xmlns:p="http://schemas.openxmlformats.org/presentationml/2006/main">
+  <p:cSld>
+    <p:spTree>
+      <p:nvGrpSpPr>
+        <p:cNvPr id="1" name=""/>
+        <p:cNvGrpSpPr/>
+        <p:nvPr/>
+      </p:nvGrpSpPr>
+      <p:grpSpPr>
+        <a:xfrm>
+          <a:off x="0" y="0"/>
+          <a:ext cx="0" cy="0"/>
+          <a:chOff x="0" y="0"/>
+          <a:chExt cx="0" cy="0"/>
+        </a:xfrm>
+      </p:grpSpPr>
       <p:sp>
         <p:nvSpPr>
           <p:cNvPr id="3" name="Text Box 2"/>
@@ -5246,6 +5427,9 @@
   <p:clrMapOvr>
     <a:masterClrMapping/>
   </p:clrMapOvr>
+  <p:transition spd="slow">
+    <p:wheel spokes="1"/>
+  </p:transition>
   <p:timing>
     <p:tnLst>
       <p:par>
@@ -5314,12 +5498,6 @@
               </a:rPr>
               <a:t>Integrantes do Grupo</a:t>
             </a:r>
-            <a:endParaRPr lang="pt-BR" sz="3600" dirty="0" smtClean="0">
-              <a:solidFill>
-                <a:srgbClr val="0000CC"/>
-              </a:solidFill>
-              <a:latin typeface="Tahoma" pitchFamily="34" charset="0"/>
-            </a:endParaRPr>
           </a:p>
         </p:txBody>
       </p:sp>
@@ -5345,7 +5523,7 @@
         </p:blipFill>
         <p:spPr>
           <a:xfrm>
-            <a:off x="467544" y="836613"/>
+            <a:off x="633171" y="841438"/>
             <a:ext cx="2348880" cy="2348880"/>
           </a:xfrm>
           <a:prstGeom prst="rect">
@@ -5361,7 +5539,7 @@
           </p:cNvPicPr>
           <p:nvPr/>
         </p:nvPicPr>
-        <p:blipFill>
+        <p:blipFill rotWithShape="1">
           <a:blip r:embed="rId3">
             <a:extLst>
               <a:ext uri="{28A0092B-C50C-407E-A947-70E740481C1C}">
@@ -5369,14 +5547,13 @@
               </a:ext>
             </a:extLst>
           </a:blip>
-          <a:stretch>
-            <a:fillRect/>
-          </a:stretch>
+          <a:srcRect b="34510"/>
+          <a:stretch/>
         </p:blipFill>
         <p:spPr>
           <a:xfrm>
-            <a:off x="3615222" y="815510"/>
-            <a:ext cx="1611408" cy="2712538"/>
+            <a:off x="3779912" y="836612"/>
+            <a:ext cx="2135052" cy="2353705"/>
           </a:xfrm>
           <a:prstGeom prst="rect">
             <a:avLst/>
@@ -5391,7 +5568,7 @@
           </p:cNvPicPr>
           <p:nvPr/>
         </p:nvPicPr>
-        <p:blipFill>
+        <p:blipFill rotWithShape="1">
           <a:blip r:embed="rId4">
             <a:extLst>
               <a:ext uri="{28A0092B-C50C-407E-A947-70E740481C1C}">
@@ -5399,14 +5576,13 @@
               </a:ext>
             </a:extLst>
           </a:blip>
-          <a:stretch>
-            <a:fillRect/>
-          </a:stretch>
+          <a:srcRect l="21258" r="21258" b="17620"/>
+          <a:stretch/>
         </p:blipFill>
         <p:spPr>
           <a:xfrm>
-            <a:off x="5833295" y="840088"/>
-            <a:ext cx="2687960" cy="2687960"/>
+            <a:off x="6754003" y="836712"/>
+            <a:ext cx="1642366" cy="2353704"/>
           </a:xfrm>
           <a:prstGeom prst="rect">
             <a:avLst/>
@@ -5435,7 +5611,7 @@
         </p:blipFill>
         <p:spPr>
           <a:xfrm>
-            <a:off x="670298" y="3501008"/>
+            <a:off x="3875752" y="3789040"/>
             <a:ext cx="1943371" cy="2029108"/>
           </a:xfrm>
           <a:prstGeom prst="rect">
@@ -5443,6 +5619,126 @@
           </a:prstGeom>
         </p:spPr>
       </p:pic>
+      <p:sp>
+        <p:nvSpPr>
+          <p:cNvPr id="6" name="CaixaDeTexto 5"/>
+          <p:cNvSpPr txBox="1"/>
+          <p:nvPr/>
+        </p:nvSpPr>
+        <p:spPr>
+          <a:xfrm>
+            <a:off x="1018132" y="3197498"/>
+            <a:ext cx="1578958" cy="369332"/>
+          </a:xfrm>
+          <a:prstGeom prst="rect">
+            <a:avLst/>
+          </a:prstGeom>
+          <a:noFill/>
+        </p:spPr>
+        <p:txBody>
+          <a:bodyPr wrap="none" rtlCol="0">
+            <a:spAutoFit/>
+          </a:bodyPr>
+          <a:lstStyle/>
+          <a:p>
+            <a:r>
+              <a:rPr lang="pt-BR" dirty="0" smtClean="0"/>
+              <a:t>Gabriel Piccolo</a:t>
+            </a:r>
+            <a:endParaRPr lang="pt-BR" dirty="0"/>
+          </a:p>
+        </p:txBody>
+      </p:sp>
+      <p:sp>
+        <p:nvSpPr>
+          <p:cNvPr id="8" name="CaixaDeTexto 7"/>
+          <p:cNvSpPr txBox="1"/>
+          <p:nvPr/>
+        </p:nvSpPr>
+        <p:spPr>
+          <a:xfrm>
+            <a:off x="4057958" y="3190317"/>
+            <a:ext cx="1444626" cy="369332"/>
+          </a:xfrm>
+          <a:prstGeom prst="rect">
+            <a:avLst/>
+          </a:prstGeom>
+          <a:noFill/>
+        </p:spPr>
+        <p:txBody>
+          <a:bodyPr wrap="none" rtlCol="0">
+            <a:spAutoFit/>
+          </a:bodyPr>
+          <a:lstStyle/>
+          <a:p>
+            <a:r>
+              <a:rPr lang="pt-BR" dirty="0" smtClean="0"/>
+              <a:t>Danilo Missio</a:t>
+            </a:r>
+            <a:endParaRPr lang="pt-BR" dirty="0"/>
+          </a:p>
+        </p:txBody>
+      </p:sp>
+      <p:sp>
+        <p:nvSpPr>
+          <p:cNvPr id="9" name="CaixaDeTexto 8"/>
+          <p:cNvSpPr txBox="1"/>
+          <p:nvPr/>
+        </p:nvSpPr>
+        <p:spPr>
+          <a:xfrm>
+            <a:off x="4057958" y="5818148"/>
+            <a:ext cx="1612621" cy="369332"/>
+          </a:xfrm>
+          <a:prstGeom prst="rect">
+            <a:avLst/>
+          </a:prstGeom>
+          <a:noFill/>
+        </p:spPr>
+        <p:txBody>
+          <a:bodyPr wrap="none" rtlCol="0">
+            <a:spAutoFit/>
+          </a:bodyPr>
+          <a:lstStyle/>
+          <a:p>
+            <a:r>
+              <a:rPr lang="pt-BR" dirty="0" smtClean="0"/>
+              <a:t>Pedro Gimenes</a:t>
+            </a:r>
+            <a:endParaRPr lang="pt-BR" dirty="0"/>
+          </a:p>
+        </p:txBody>
+      </p:sp>
+      <p:sp>
+        <p:nvSpPr>
+          <p:cNvPr id="10" name="CaixaDeTexto 9"/>
+          <p:cNvSpPr txBox="1"/>
+          <p:nvPr/>
+        </p:nvSpPr>
+        <p:spPr>
+          <a:xfrm>
+            <a:off x="6785707" y="3197498"/>
+            <a:ext cx="1617815" cy="369332"/>
+          </a:xfrm>
+          <a:prstGeom prst="rect">
+            <a:avLst/>
+          </a:prstGeom>
+          <a:noFill/>
+        </p:spPr>
+        <p:txBody>
+          <a:bodyPr wrap="none" rtlCol="0">
+            <a:spAutoFit/>
+          </a:bodyPr>
+          <a:lstStyle/>
+          <a:p>
+            <a:r>
+              <a:rPr lang="pt-BR" dirty="0" smtClean="0"/>
+              <a:t>Vinícius Romão</a:t>
+            </a:r>
+            <a:endParaRPr lang="pt-BR" dirty="0"/>
+          </a:p>
+        </p:txBody>
+      </p:sp>
     </p:spTree>
   </p:cSld>
   <p:clrMapOvr>
@@ -5451,9 +5747,798 @@
   <p:timing>
     <p:tnLst>
       <p:par>
-        <p:cTn id="1" dur="indefinite" restart="never" nodeType="tmRoot"/>
+        <p:cTn id="1" dur="indefinite" restart="never" nodeType="tmRoot">
+          <p:childTnLst>
+            <p:seq concurrent="1" nextAc="seek">
+              <p:cTn id="2" dur="indefinite" nodeType="mainSeq">
+                <p:childTnLst>
+                  <p:par>
+                    <p:cTn id="3" fill="hold">
+                      <p:stCondLst>
+                        <p:cond delay="indefinite"/>
+                      </p:stCondLst>
+                      <p:childTnLst>
+                        <p:par>
+                          <p:cTn id="4" fill="hold">
+                            <p:stCondLst>
+                              <p:cond delay="0"/>
+                            </p:stCondLst>
+                            <p:childTnLst>
+                              <p:par>
+                                <p:cTn id="5" presetID="2" presetClass="entr" presetSubtype="4" fill="hold" nodeType="clickEffect">
+                                  <p:stCondLst>
+                                    <p:cond delay="0"/>
+                                  </p:stCondLst>
+                                  <p:childTnLst>
+                                    <p:set>
+                                      <p:cBhvr>
+                                        <p:cTn id="6" dur="1" fill="hold">
+                                          <p:stCondLst>
+                                            <p:cond delay="0"/>
+                                          </p:stCondLst>
+                                        </p:cTn>
+                                        <p:tgtEl>
+                                          <p:spTgt spid="3"/>
+                                        </p:tgtEl>
+                                        <p:attrNameLst>
+                                          <p:attrName>style.visibility</p:attrName>
+                                        </p:attrNameLst>
+                                      </p:cBhvr>
+                                      <p:to>
+                                        <p:strVal val="visible"/>
+                                      </p:to>
+                                    </p:set>
+                                    <p:anim calcmode="lin" valueType="num">
+                                      <p:cBhvr additive="base">
+                                        <p:cTn id="7" dur="500" fill="hold"/>
+                                        <p:tgtEl>
+                                          <p:spTgt spid="3"/>
+                                        </p:tgtEl>
+                                        <p:attrNameLst>
+                                          <p:attrName>ppt_x</p:attrName>
+                                        </p:attrNameLst>
+                                      </p:cBhvr>
+                                      <p:tavLst>
+                                        <p:tav tm="0">
+                                          <p:val>
+                                            <p:strVal val="#ppt_x"/>
+                                          </p:val>
+                                        </p:tav>
+                                        <p:tav tm="100000">
+                                          <p:val>
+                                            <p:strVal val="#ppt_x"/>
+                                          </p:val>
+                                        </p:tav>
+                                      </p:tavLst>
+                                    </p:anim>
+                                    <p:anim calcmode="lin" valueType="num">
+                                      <p:cBhvr additive="base">
+                                        <p:cTn id="8" dur="500" fill="hold"/>
+                                        <p:tgtEl>
+                                          <p:spTgt spid="3"/>
+                                        </p:tgtEl>
+                                        <p:attrNameLst>
+                                          <p:attrName>ppt_y</p:attrName>
+                                        </p:attrNameLst>
+                                      </p:cBhvr>
+                                      <p:tavLst>
+                                        <p:tav tm="0">
+                                          <p:val>
+                                            <p:strVal val="1+#ppt_h/2"/>
+                                          </p:val>
+                                        </p:tav>
+                                        <p:tav tm="100000">
+                                          <p:val>
+                                            <p:strVal val="#ppt_y"/>
+                                          </p:val>
+                                        </p:tav>
+                                      </p:tavLst>
+                                    </p:anim>
+                                  </p:childTnLst>
+                                </p:cTn>
+                              </p:par>
+                            </p:childTnLst>
+                          </p:cTn>
+                        </p:par>
+                      </p:childTnLst>
+                    </p:cTn>
+                  </p:par>
+                  <p:par>
+                    <p:cTn id="9" fill="hold">
+                      <p:stCondLst>
+                        <p:cond delay="indefinite"/>
+                      </p:stCondLst>
+                      <p:childTnLst>
+                        <p:par>
+                          <p:cTn id="10" fill="hold">
+                            <p:stCondLst>
+                              <p:cond delay="0"/>
+                            </p:stCondLst>
+                            <p:childTnLst>
+                              <p:par>
+                                <p:cTn id="11" presetID="42" presetClass="entr" presetSubtype="0" fill="hold" grpId="0" nodeType="clickEffect">
+                                  <p:stCondLst>
+                                    <p:cond delay="0"/>
+                                  </p:stCondLst>
+                                  <p:childTnLst>
+                                    <p:set>
+                                      <p:cBhvr>
+                                        <p:cTn id="12" dur="1" fill="hold">
+                                          <p:stCondLst>
+                                            <p:cond delay="0"/>
+                                          </p:stCondLst>
+                                        </p:cTn>
+                                        <p:tgtEl>
+                                          <p:spTgt spid="8"/>
+                                        </p:tgtEl>
+                                        <p:attrNameLst>
+                                          <p:attrName>style.visibility</p:attrName>
+                                        </p:attrNameLst>
+                                      </p:cBhvr>
+                                      <p:to>
+                                        <p:strVal val="visible"/>
+                                      </p:to>
+                                    </p:set>
+                                    <p:animEffect transition="in" filter="fade">
+                                      <p:cBhvr>
+                                        <p:cTn id="13" dur="1000"/>
+                                        <p:tgtEl>
+                                          <p:spTgt spid="8"/>
+                                        </p:tgtEl>
+                                      </p:cBhvr>
+                                    </p:animEffect>
+                                    <p:anim calcmode="lin" valueType="num">
+                                      <p:cBhvr>
+                                        <p:cTn id="14" dur="1000" fill="hold"/>
+                                        <p:tgtEl>
+                                          <p:spTgt spid="8"/>
+                                        </p:tgtEl>
+                                        <p:attrNameLst>
+                                          <p:attrName>ppt_x</p:attrName>
+                                        </p:attrNameLst>
+                                      </p:cBhvr>
+                                      <p:tavLst>
+                                        <p:tav tm="0">
+                                          <p:val>
+                                            <p:strVal val="#ppt_x"/>
+                                          </p:val>
+                                        </p:tav>
+                                        <p:tav tm="100000">
+                                          <p:val>
+                                            <p:strVal val="#ppt_x"/>
+                                          </p:val>
+                                        </p:tav>
+                                      </p:tavLst>
+                                    </p:anim>
+                                    <p:anim calcmode="lin" valueType="num">
+                                      <p:cBhvr>
+                                        <p:cTn id="15" dur="1000" fill="hold"/>
+                                        <p:tgtEl>
+                                          <p:spTgt spid="8"/>
+                                        </p:tgtEl>
+                                        <p:attrNameLst>
+                                          <p:attrName>ppt_y</p:attrName>
+                                        </p:attrNameLst>
+                                      </p:cBhvr>
+                                      <p:tavLst>
+                                        <p:tav tm="0">
+                                          <p:val>
+                                            <p:strVal val="#ppt_y+.1"/>
+                                          </p:val>
+                                        </p:tav>
+                                        <p:tav tm="100000">
+                                          <p:val>
+                                            <p:strVal val="#ppt_y"/>
+                                          </p:val>
+                                        </p:tav>
+                                      </p:tavLst>
+                                    </p:anim>
+                                  </p:childTnLst>
+                                </p:cTn>
+                              </p:par>
+                            </p:childTnLst>
+                          </p:cTn>
+                        </p:par>
+                      </p:childTnLst>
+                    </p:cTn>
+                  </p:par>
+                  <p:par>
+                    <p:cTn id="16" fill="hold">
+                      <p:stCondLst>
+                        <p:cond delay="indefinite"/>
+                      </p:stCondLst>
+                      <p:childTnLst>
+                        <p:par>
+                          <p:cTn id="17" fill="hold">
+                            <p:stCondLst>
+                              <p:cond delay="0"/>
+                            </p:stCondLst>
+                            <p:childTnLst>
+                              <p:par>
+                                <p:cTn id="18" presetID="2" presetClass="entr" presetSubtype="2" fill="hold" nodeType="clickEffect">
+                                  <p:stCondLst>
+                                    <p:cond delay="0"/>
+                                  </p:stCondLst>
+                                  <p:childTnLst>
+                                    <p:set>
+                                      <p:cBhvr>
+                                        <p:cTn id="19" dur="1" fill="hold">
+                                          <p:stCondLst>
+                                            <p:cond delay="0"/>
+                                          </p:stCondLst>
+                                        </p:cTn>
+                                        <p:tgtEl>
+                                          <p:spTgt spid="4"/>
+                                        </p:tgtEl>
+                                        <p:attrNameLst>
+                                          <p:attrName>style.visibility</p:attrName>
+                                        </p:attrNameLst>
+                                      </p:cBhvr>
+                                      <p:to>
+                                        <p:strVal val="visible"/>
+                                      </p:to>
+                                    </p:set>
+                                    <p:anim calcmode="lin" valueType="num">
+                                      <p:cBhvr additive="base">
+                                        <p:cTn id="20" dur="500" fill="hold"/>
+                                        <p:tgtEl>
+                                          <p:spTgt spid="4"/>
+                                        </p:tgtEl>
+                                        <p:attrNameLst>
+                                          <p:attrName>ppt_x</p:attrName>
+                                        </p:attrNameLst>
+                                      </p:cBhvr>
+                                      <p:tavLst>
+                                        <p:tav tm="0">
+                                          <p:val>
+                                            <p:strVal val="1+#ppt_w/2"/>
+                                          </p:val>
+                                        </p:tav>
+                                        <p:tav tm="100000">
+                                          <p:val>
+                                            <p:strVal val="#ppt_x"/>
+                                          </p:val>
+                                        </p:tav>
+                                      </p:tavLst>
+                                    </p:anim>
+                                    <p:anim calcmode="lin" valueType="num">
+                                      <p:cBhvr additive="base">
+                                        <p:cTn id="21" dur="500" fill="hold"/>
+                                        <p:tgtEl>
+                                          <p:spTgt spid="4"/>
+                                        </p:tgtEl>
+                                        <p:attrNameLst>
+                                          <p:attrName>ppt_y</p:attrName>
+                                        </p:attrNameLst>
+                                      </p:cBhvr>
+                                      <p:tavLst>
+                                        <p:tav tm="0">
+                                          <p:val>
+                                            <p:strVal val="#ppt_y"/>
+                                          </p:val>
+                                        </p:tav>
+                                        <p:tav tm="100000">
+                                          <p:val>
+                                            <p:strVal val="#ppt_y"/>
+                                          </p:val>
+                                        </p:tav>
+                                      </p:tavLst>
+                                    </p:anim>
+                                  </p:childTnLst>
+                                </p:cTn>
+                              </p:par>
+                            </p:childTnLst>
+                          </p:cTn>
+                        </p:par>
+                      </p:childTnLst>
+                    </p:cTn>
+                  </p:par>
+                  <p:par>
+                    <p:cTn id="22" fill="hold">
+                      <p:stCondLst>
+                        <p:cond delay="indefinite"/>
+                      </p:stCondLst>
+                      <p:childTnLst>
+                        <p:par>
+                          <p:cTn id="23" fill="hold">
+                            <p:stCondLst>
+                              <p:cond delay="0"/>
+                            </p:stCondLst>
+                            <p:childTnLst>
+                              <p:par>
+                                <p:cTn id="24" presetID="42" presetClass="entr" presetSubtype="0" fill="hold" grpId="0" nodeType="clickEffect">
+                                  <p:stCondLst>
+                                    <p:cond delay="0"/>
+                                  </p:stCondLst>
+                                  <p:childTnLst>
+                                    <p:set>
+                                      <p:cBhvr>
+                                        <p:cTn id="25" dur="1" fill="hold">
+                                          <p:stCondLst>
+                                            <p:cond delay="0"/>
+                                          </p:stCondLst>
+                                        </p:cTn>
+                                        <p:tgtEl>
+                                          <p:spTgt spid="10"/>
+                                        </p:tgtEl>
+                                        <p:attrNameLst>
+                                          <p:attrName>style.visibility</p:attrName>
+                                        </p:attrNameLst>
+                                      </p:cBhvr>
+                                      <p:to>
+                                        <p:strVal val="visible"/>
+                                      </p:to>
+                                    </p:set>
+                                    <p:animEffect transition="in" filter="fade">
+                                      <p:cBhvr>
+                                        <p:cTn id="26" dur="1000"/>
+                                        <p:tgtEl>
+                                          <p:spTgt spid="10"/>
+                                        </p:tgtEl>
+                                      </p:cBhvr>
+                                    </p:animEffect>
+                                    <p:anim calcmode="lin" valueType="num">
+                                      <p:cBhvr>
+                                        <p:cTn id="27" dur="1000" fill="hold"/>
+                                        <p:tgtEl>
+                                          <p:spTgt spid="10"/>
+                                        </p:tgtEl>
+                                        <p:attrNameLst>
+                                          <p:attrName>ppt_x</p:attrName>
+                                        </p:attrNameLst>
+                                      </p:cBhvr>
+                                      <p:tavLst>
+                                        <p:tav tm="0">
+                                          <p:val>
+                                            <p:strVal val="#ppt_x"/>
+                                          </p:val>
+                                        </p:tav>
+                                        <p:tav tm="100000">
+                                          <p:val>
+                                            <p:strVal val="#ppt_x"/>
+                                          </p:val>
+                                        </p:tav>
+                                      </p:tavLst>
+                                    </p:anim>
+                                    <p:anim calcmode="lin" valueType="num">
+                                      <p:cBhvr>
+                                        <p:cTn id="28" dur="1000" fill="hold"/>
+                                        <p:tgtEl>
+                                          <p:spTgt spid="10"/>
+                                        </p:tgtEl>
+                                        <p:attrNameLst>
+                                          <p:attrName>ppt_y</p:attrName>
+                                        </p:attrNameLst>
+                                      </p:cBhvr>
+                                      <p:tavLst>
+                                        <p:tav tm="0">
+                                          <p:val>
+                                            <p:strVal val="#ppt_y+.1"/>
+                                          </p:val>
+                                        </p:tav>
+                                        <p:tav tm="100000">
+                                          <p:val>
+                                            <p:strVal val="#ppt_y"/>
+                                          </p:val>
+                                        </p:tav>
+                                      </p:tavLst>
+                                    </p:anim>
+                                  </p:childTnLst>
+                                </p:cTn>
+                              </p:par>
+                            </p:childTnLst>
+                          </p:cTn>
+                        </p:par>
+                      </p:childTnLst>
+                    </p:cTn>
+                  </p:par>
+                  <p:par>
+                    <p:cTn id="29" fill="hold">
+                      <p:stCondLst>
+                        <p:cond delay="indefinite"/>
+                      </p:stCondLst>
+                      <p:childTnLst>
+                        <p:par>
+                          <p:cTn id="30" fill="hold">
+                            <p:stCondLst>
+                              <p:cond delay="0"/>
+                            </p:stCondLst>
+                            <p:childTnLst>
+                              <p:par>
+                                <p:cTn id="31" presetID="2" presetClass="entr" presetSubtype="8" fill="hold" nodeType="clickEffect">
+                                  <p:stCondLst>
+                                    <p:cond delay="0"/>
+                                  </p:stCondLst>
+                                  <p:childTnLst>
+                                    <p:set>
+                                      <p:cBhvr>
+                                        <p:cTn id="32" dur="1" fill="hold">
+                                          <p:stCondLst>
+                                            <p:cond delay="0"/>
+                                          </p:stCondLst>
+                                        </p:cTn>
+                                        <p:tgtEl>
+                                          <p:spTgt spid="2"/>
+                                        </p:tgtEl>
+                                        <p:attrNameLst>
+                                          <p:attrName>style.visibility</p:attrName>
+                                        </p:attrNameLst>
+                                      </p:cBhvr>
+                                      <p:to>
+                                        <p:strVal val="visible"/>
+                                      </p:to>
+                                    </p:set>
+                                    <p:anim calcmode="lin" valueType="num">
+                                      <p:cBhvr additive="base">
+                                        <p:cTn id="33" dur="500" fill="hold"/>
+                                        <p:tgtEl>
+                                          <p:spTgt spid="2"/>
+                                        </p:tgtEl>
+                                        <p:attrNameLst>
+                                          <p:attrName>ppt_x</p:attrName>
+                                        </p:attrNameLst>
+                                      </p:cBhvr>
+                                      <p:tavLst>
+                                        <p:tav tm="0">
+                                          <p:val>
+                                            <p:strVal val="0-#ppt_w/2"/>
+                                          </p:val>
+                                        </p:tav>
+                                        <p:tav tm="100000">
+                                          <p:val>
+                                            <p:strVal val="#ppt_x"/>
+                                          </p:val>
+                                        </p:tav>
+                                      </p:tavLst>
+                                    </p:anim>
+                                    <p:anim calcmode="lin" valueType="num">
+                                      <p:cBhvr additive="base">
+                                        <p:cTn id="34" dur="500" fill="hold"/>
+                                        <p:tgtEl>
+                                          <p:spTgt spid="2"/>
+                                        </p:tgtEl>
+                                        <p:attrNameLst>
+                                          <p:attrName>ppt_y</p:attrName>
+                                        </p:attrNameLst>
+                                      </p:cBhvr>
+                                      <p:tavLst>
+                                        <p:tav tm="0">
+                                          <p:val>
+                                            <p:strVal val="#ppt_y"/>
+                                          </p:val>
+                                        </p:tav>
+                                        <p:tav tm="100000">
+                                          <p:val>
+                                            <p:strVal val="#ppt_y"/>
+                                          </p:val>
+                                        </p:tav>
+                                      </p:tavLst>
+                                    </p:anim>
+                                  </p:childTnLst>
+                                </p:cTn>
+                              </p:par>
+                            </p:childTnLst>
+                          </p:cTn>
+                        </p:par>
+                      </p:childTnLst>
+                    </p:cTn>
+                  </p:par>
+                  <p:par>
+                    <p:cTn id="35" fill="hold">
+                      <p:stCondLst>
+                        <p:cond delay="indefinite"/>
+                      </p:stCondLst>
+                      <p:childTnLst>
+                        <p:par>
+                          <p:cTn id="36" fill="hold">
+                            <p:stCondLst>
+                              <p:cond delay="0"/>
+                            </p:stCondLst>
+                            <p:childTnLst>
+                              <p:par>
+                                <p:cTn id="37" presetID="42" presetClass="entr" presetSubtype="0" fill="hold" grpId="0" nodeType="clickEffect">
+                                  <p:stCondLst>
+                                    <p:cond delay="0"/>
+                                  </p:stCondLst>
+                                  <p:childTnLst>
+                                    <p:set>
+                                      <p:cBhvr>
+                                        <p:cTn id="38" dur="1" fill="hold">
+                                          <p:stCondLst>
+                                            <p:cond delay="0"/>
+                                          </p:stCondLst>
+                                        </p:cTn>
+                                        <p:tgtEl>
+                                          <p:spTgt spid="6"/>
+                                        </p:tgtEl>
+                                        <p:attrNameLst>
+                                          <p:attrName>style.visibility</p:attrName>
+                                        </p:attrNameLst>
+                                      </p:cBhvr>
+                                      <p:to>
+                                        <p:strVal val="visible"/>
+                                      </p:to>
+                                    </p:set>
+                                    <p:animEffect transition="in" filter="fade">
+                                      <p:cBhvr>
+                                        <p:cTn id="39" dur="1000"/>
+                                        <p:tgtEl>
+                                          <p:spTgt spid="6"/>
+                                        </p:tgtEl>
+                                      </p:cBhvr>
+                                    </p:animEffect>
+                                    <p:anim calcmode="lin" valueType="num">
+                                      <p:cBhvr>
+                                        <p:cTn id="40" dur="1000" fill="hold"/>
+                                        <p:tgtEl>
+                                          <p:spTgt spid="6"/>
+                                        </p:tgtEl>
+                                        <p:attrNameLst>
+                                          <p:attrName>ppt_x</p:attrName>
+                                        </p:attrNameLst>
+                                      </p:cBhvr>
+                                      <p:tavLst>
+                                        <p:tav tm="0">
+                                          <p:val>
+                                            <p:strVal val="#ppt_x"/>
+                                          </p:val>
+                                        </p:tav>
+                                        <p:tav tm="100000">
+                                          <p:val>
+                                            <p:strVal val="#ppt_x"/>
+                                          </p:val>
+                                        </p:tav>
+                                      </p:tavLst>
+                                    </p:anim>
+                                    <p:anim calcmode="lin" valueType="num">
+                                      <p:cBhvr>
+                                        <p:cTn id="41" dur="1000" fill="hold"/>
+                                        <p:tgtEl>
+                                          <p:spTgt spid="6"/>
+                                        </p:tgtEl>
+                                        <p:attrNameLst>
+                                          <p:attrName>ppt_y</p:attrName>
+                                        </p:attrNameLst>
+                                      </p:cBhvr>
+                                      <p:tavLst>
+                                        <p:tav tm="0">
+                                          <p:val>
+                                            <p:strVal val="#ppt_y+.1"/>
+                                          </p:val>
+                                        </p:tav>
+                                        <p:tav tm="100000">
+                                          <p:val>
+                                            <p:strVal val="#ppt_y"/>
+                                          </p:val>
+                                        </p:tav>
+                                      </p:tavLst>
+                                    </p:anim>
+                                  </p:childTnLst>
+                                </p:cTn>
+                              </p:par>
+                            </p:childTnLst>
+                          </p:cTn>
+                        </p:par>
+                      </p:childTnLst>
+                    </p:cTn>
+                  </p:par>
+                  <p:par>
+                    <p:cTn id="42" fill="hold">
+                      <p:stCondLst>
+                        <p:cond delay="indefinite"/>
+                      </p:stCondLst>
+                      <p:childTnLst>
+                        <p:par>
+                          <p:cTn id="43" fill="hold">
+                            <p:stCondLst>
+                              <p:cond delay="0"/>
+                            </p:stCondLst>
+                            <p:childTnLst>
+                              <p:par>
+                                <p:cTn id="44" presetID="2" presetClass="entr" presetSubtype="4" fill="hold" nodeType="clickEffect">
+                                  <p:stCondLst>
+                                    <p:cond delay="0"/>
+                                  </p:stCondLst>
+                                  <p:childTnLst>
+                                    <p:set>
+                                      <p:cBhvr>
+                                        <p:cTn id="45" dur="1" fill="hold">
+                                          <p:stCondLst>
+                                            <p:cond delay="0"/>
+                                          </p:stCondLst>
+                                        </p:cTn>
+                                        <p:tgtEl>
+                                          <p:spTgt spid="5"/>
+                                        </p:tgtEl>
+                                        <p:attrNameLst>
+                                          <p:attrName>style.visibility</p:attrName>
+                                        </p:attrNameLst>
+                                      </p:cBhvr>
+                                      <p:to>
+                                        <p:strVal val="visible"/>
+                                      </p:to>
+                                    </p:set>
+                                    <p:anim calcmode="lin" valueType="num">
+                                      <p:cBhvr additive="base">
+                                        <p:cTn id="46" dur="500" fill="hold"/>
+                                        <p:tgtEl>
+                                          <p:spTgt spid="5"/>
+                                        </p:tgtEl>
+                                        <p:attrNameLst>
+                                          <p:attrName>ppt_x</p:attrName>
+                                        </p:attrNameLst>
+                                      </p:cBhvr>
+                                      <p:tavLst>
+                                        <p:tav tm="0">
+                                          <p:val>
+                                            <p:strVal val="#ppt_x"/>
+                                          </p:val>
+                                        </p:tav>
+                                        <p:tav tm="100000">
+                                          <p:val>
+                                            <p:strVal val="#ppt_x"/>
+                                          </p:val>
+                                        </p:tav>
+                                      </p:tavLst>
+                                    </p:anim>
+                                    <p:anim calcmode="lin" valueType="num">
+                                      <p:cBhvr additive="base">
+                                        <p:cTn id="47" dur="500" fill="hold"/>
+                                        <p:tgtEl>
+                                          <p:spTgt spid="5"/>
+                                        </p:tgtEl>
+                                        <p:attrNameLst>
+                                          <p:attrName>ppt_y</p:attrName>
+                                        </p:attrNameLst>
+                                      </p:cBhvr>
+                                      <p:tavLst>
+                                        <p:tav tm="0">
+                                          <p:val>
+                                            <p:strVal val="1+#ppt_h/2"/>
+                                          </p:val>
+                                        </p:tav>
+                                        <p:tav tm="100000">
+                                          <p:val>
+                                            <p:strVal val="#ppt_y"/>
+                                          </p:val>
+                                        </p:tav>
+                                      </p:tavLst>
+                                    </p:anim>
+                                  </p:childTnLst>
+                                </p:cTn>
+                              </p:par>
+                            </p:childTnLst>
+                          </p:cTn>
+                        </p:par>
+                      </p:childTnLst>
+                    </p:cTn>
+                  </p:par>
+                  <p:par>
+                    <p:cTn id="48" fill="hold">
+                      <p:stCondLst>
+                        <p:cond delay="indefinite"/>
+                      </p:stCondLst>
+                      <p:childTnLst>
+                        <p:par>
+                          <p:cTn id="49" fill="hold">
+                            <p:stCondLst>
+                              <p:cond delay="0"/>
+                            </p:stCondLst>
+                            <p:childTnLst>
+                              <p:par>
+                                <p:cTn id="50" presetID="42" presetClass="entr" presetSubtype="0" fill="hold" grpId="0" nodeType="clickEffect">
+                                  <p:stCondLst>
+                                    <p:cond delay="0"/>
+                                  </p:stCondLst>
+                                  <p:childTnLst>
+                                    <p:set>
+                                      <p:cBhvr>
+                                        <p:cTn id="51" dur="1" fill="hold">
+                                          <p:stCondLst>
+                                            <p:cond delay="0"/>
+                                          </p:stCondLst>
+                                        </p:cTn>
+                                        <p:tgtEl>
+                                          <p:spTgt spid="9"/>
+                                        </p:tgtEl>
+                                        <p:attrNameLst>
+                                          <p:attrName>style.visibility</p:attrName>
+                                        </p:attrNameLst>
+                                      </p:cBhvr>
+                                      <p:to>
+                                        <p:strVal val="visible"/>
+                                      </p:to>
+                                    </p:set>
+                                    <p:animEffect transition="in" filter="fade">
+                                      <p:cBhvr>
+                                        <p:cTn id="52" dur="1000"/>
+                                        <p:tgtEl>
+                                          <p:spTgt spid="9"/>
+                                        </p:tgtEl>
+                                      </p:cBhvr>
+                                    </p:animEffect>
+                                    <p:anim calcmode="lin" valueType="num">
+                                      <p:cBhvr>
+                                        <p:cTn id="53" dur="1000" fill="hold"/>
+                                        <p:tgtEl>
+                                          <p:spTgt spid="9"/>
+                                        </p:tgtEl>
+                                        <p:attrNameLst>
+                                          <p:attrName>ppt_x</p:attrName>
+                                        </p:attrNameLst>
+                                      </p:cBhvr>
+                                      <p:tavLst>
+                                        <p:tav tm="0">
+                                          <p:val>
+                                            <p:strVal val="#ppt_x"/>
+                                          </p:val>
+                                        </p:tav>
+                                        <p:tav tm="100000">
+                                          <p:val>
+                                            <p:strVal val="#ppt_x"/>
+                                          </p:val>
+                                        </p:tav>
+                                      </p:tavLst>
+                                    </p:anim>
+                                    <p:anim calcmode="lin" valueType="num">
+                                      <p:cBhvr>
+                                        <p:cTn id="54" dur="1000" fill="hold"/>
+                                        <p:tgtEl>
+                                          <p:spTgt spid="9"/>
+                                        </p:tgtEl>
+                                        <p:attrNameLst>
+                                          <p:attrName>ppt_y</p:attrName>
+                                        </p:attrNameLst>
+                                      </p:cBhvr>
+                                      <p:tavLst>
+                                        <p:tav tm="0">
+                                          <p:val>
+                                            <p:strVal val="#ppt_y+.1"/>
+                                          </p:val>
+                                        </p:tav>
+                                        <p:tav tm="100000">
+                                          <p:val>
+                                            <p:strVal val="#ppt_y"/>
+                                          </p:val>
+                                        </p:tav>
+                                      </p:tavLst>
+                                    </p:anim>
+                                  </p:childTnLst>
+                                </p:cTn>
+                              </p:par>
+                            </p:childTnLst>
+                          </p:cTn>
+                        </p:par>
+                      </p:childTnLst>
+                    </p:cTn>
+                  </p:par>
+                </p:childTnLst>
+              </p:cTn>
+              <p:prevCondLst>
+                <p:cond evt="onPrev" delay="0">
+                  <p:tgtEl>
+                    <p:sldTgt/>
+                  </p:tgtEl>
+                </p:cond>
+              </p:prevCondLst>
+              <p:nextCondLst>
+                <p:cond evt="onNext" delay="0">
+                  <p:tgtEl>
+                    <p:sldTgt/>
+                  </p:tgtEl>
+                </p:cond>
+              </p:nextCondLst>
+            </p:seq>
+          </p:childTnLst>
+        </p:cTn>
       </p:par>
     </p:tnLst>
+    <p:bldLst>
+      <p:bldP spid="6" grpId="0"/>
+      <p:bldP spid="8" grpId="0"/>
+      <p:bldP spid="9" grpId="0"/>
+      <p:bldP spid="10" grpId="0"/>
+    </p:bldLst>
   </p:timing>
 </p:sld>
 </file>
@@ -5683,12 +6768,6 @@
               </a:rPr>
               <a:t>Clínica Lab</a:t>
             </a:r>
-            <a:endParaRPr lang="pt-BR" sz="3600" dirty="0" smtClean="0">
-              <a:solidFill>
-                <a:srgbClr val="0000CC"/>
-              </a:solidFill>
-              <a:latin typeface="Tahoma" pitchFamily="34" charset="0"/>
-            </a:endParaRPr>
           </a:p>
         </p:txBody>
       </p:sp>
@@ -5702,10 +6781,448 @@
   <p:clrMapOvr>
     <a:masterClrMapping/>
   </p:clrMapOvr>
+  <p:transition spd="slow">
+    <p:cover/>
+  </p:transition>
   <p:timing>
     <p:tnLst>
       <p:par>
-        <p:cTn id="1" dur="indefinite" restart="never" nodeType="tmRoot"/>
+        <p:cTn id="1" dur="indefinite" restart="never" nodeType="tmRoot">
+          <p:childTnLst>
+            <p:seq concurrent="1" nextAc="seek">
+              <p:cTn id="2" dur="indefinite" nodeType="mainSeq">
+                <p:childTnLst>
+                  <p:par>
+                    <p:cTn id="3" fill="hold">
+                      <p:stCondLst>
+                        <p:cond delay="indefinite"/>
+                      </p:stCondLst>
+                      <p:childTnLst>
+                        <p:par>
+                          <p:cTn id="4" fill="hold">
+                            <p:stCondLst>
+                              <p:cond delay="0"/>
+                            </p:stCondLst>
+                            <p:childTnLst>
+                              <p:par>
+                                <p:cTn id="5" presetID="2" presetClass="entr" presetSubtype="4" fill="hold" nodeType="clickEffect">
+                                  <p:stCondLst>
+                                    <p:cond delay="0"/>
+                                  </p:stCondLst>
+                                  <p:childTnLst>
+                                    <p:set>
+                                      <p:cBhvr>
+                                        <p:cTn id="6" dur="1" fill="hold">
+                                          <p:stCondLst>
+                                            <p:cond delay="0"/>
+                                          </p:stCondLst>
+                                        </p:cTn>
+                                        <p:tgtEl>
+                                          <p:spTgt spid="80898">
+                                            <p:txEl>
+                                              <p:pRg st="0" end="0"/>
+                                            </p:txEl>
+                                          </p:spTgt>
+                                        </p:tgtEl>
+                                        <p:attrNameLst>
+                                          <p:attrName>style.visibility</p:attrName>
+                                        </p:attrNameLst>
+                                      </p:cBhvr>
+                                      <p:to>
+                                        <p:strVal val="visible"/>
+                                      </p:to>
+                                    </p:set>
+                                    <p:anim calcmode="lin" valueType="num">
+                                      <p:cBhvr additive="base">
+                                        <p:cTn id="7" dur="500" fill="hold"/>
+                                        <p:tgtEl>
+                                          <p:spTgt spid="80898">
+                                            <p:txEl>
+                                              <p:pRg st="0" end="0"/>
+                                            </p:txEl>
+                                          </p:spTgt>
+                                        </p:tgtEl>
+                                        <p:attrNameLst>
+                                          <p:attrName>ppt_x</p:attrName>
+                                        </p:attrNameLst>
+                                      </p:cBhvr>
+                                      <p:tavLst>
+                                        <p:tav tm="0">
+                                          <p:val>
+                                            <p:strVal val="#ppt_x"/>
+                                          </p:val>
+                                        </p:tav>
+                                        <p:tav tm="100000">
+                                          <p:val>
+                                            <p:strVal val="#ppt_x"/>
+                                          </p:val>
+                                        </p:tav>
+                                      </p:tavLst>
+                                    </p:anim>
+                                    <p:anim calcmode="lin" valueType="num">
+                                      <p:cBhvr additive="base">
+                                        <p:cTn id="8" dur="500" fill="hold"/>
+                                        <p:tgtEl>
+                                          <p:spTgt spid="80898">
+                                            <p:txEl>
+                                              <p:pRg st="0" end="0"/>
+                                            </p:txEl>
+                                          </p:spTgt>
+                                        </p:tgtEl>
+                                        <p:attrNameLst>
+                                          <p:attrName>ppt_y</p:attrName>
+                                        </p:attrNameLst>
+                                      </p:cBhvr>
+                                      <p:tavLst>
+                                        <p:tav tm="0">
+                                          <p:val>
+                                            <p:strVal val="1+#ppt_h/2"/>
+                                          </p:val>
+                                        </p:tav>
+                                        <p:tav tm="100000">
+                                          <p:val>
+                                            <p:strVal val="#ppt_y"/>
+                                          </p:val>
+                                        </p:tav>
+                                      </p:tavLst>
+                                    </p:anim>
+                                  </p:childTnLst>
+                                </p:cTn>
+                              </p:par>
+                            </p:childTnLst>
+                          </p:cTn>
+                        </p:par>
+                      </p:childTnLst>
+                    </p:cTn>
+                  </p:par>
+                  <p:par>
+                    <p:cTn id="9" fill="hold">
+                      <p:stCondLst>
+                        <p:cond delay="indefinite"/>
+                      </p:stCondLst>
+                      <p:childTnLst>
+                        <p:par>
+                          <p:cTn id="10" fill="hold">
+                            <p:stCondLst>
+                              <p:cond delay="0"/>
+                            </p:stCondLst>
+                            <p:childTnLst>
+                              <p:par>
+                                <p:cTn id="11" presetID="2" presetClass="entr" presetSubtype="4" fill="hold" nodeType="clickEffect">
+                                  <p:stCondLst>
+                                    <p:cond delay="0"/>
+                                  </p:stCondLst>
+                                  <p:childTnLst>
+                                    <p:set>
+                                      <p:cBhvr>
+                                        <p:cTn id="12" dur="1" fill="hold">
+                                          <p:stCondLst>
+                                            <p:cond delay="0"/>
+                                          </p:stCondLst>
+                                        </p:cTn>
+                                        <p:tgtEl>
+                                          <p:spTgt spid="80898">
+                                            <p:txEl>
+                                              <p:pRg st="2" end="2"/>
+                                            </p:txEl>
+                                          </p:spTgt>
+                                        </p:tgtEl>
+                                        <p:attrNameLst>
+                                          <p:attrName>style.visibility</p:attrName>
+                                        </p:attrNameLst>
+                                      </p:cBhvr>
+                                      <p:to>
+                                        <p:strVal val="visible"/>
+                                      </p:to>
+                                    </p:set>
+                                    <p:anim calcmode="lin" valueType="num">
+                                      <p:cBhvr additive="base">
+                                        <p:cTn id="13" dur="500" fill="hold"/>
+                                        <p:tgtEl>
+                                          <p:spTgt spid="80898">
+                                            <p:txEl>
+                                              <p:pRg st="2" end="2"/>
+                                            </p:txEl>
+                                          </p:spTgt>
+                                        </p:tgtEl>
+                                        <p:attrNameLst>
+                                          <p:attrName>ppt_x</p:attrName>
+                                        </p:attrNameLst>
+                                      </p:cBhvr>
+                                      <p:tavLst>
+                                        <p:tav tm="0">
+                                          <p:val>
+                                            <p:strVal val="#ppt_x"/>
+                                          </p:val>
+                                        </p:tav>
+                                        <p:tav tm="100000">
+                                          <p:val>
+                                            <p:strVal val="#ppt_x"/>
+                                          </p:val>
+                                        </p:tav>
+                                      </p:tavLst>
+                                    </p:anim>
+                                    <p:anim calcmode="lin" valueType="num">
+                                      <p:cBhvr additive="base">
+                                        <p:cTn id="14" dur="500" fill="hold"/>
+                                        <p:tgtEl>
+                                          <p:spTgt spid="80898">
+                                            <p:txEl>
+                                              <p:pRg st="2" end="2"/>
+                                            </p:txEl>
+                                          </p:spTgt>
+                                        </p:tgtEl>
+                                        <p:attrNameLst>
+                                          <p:attrName>ppt_y</p:attrName>
+                                        </p:attrNameLst>
+                                      </p:cBhvr>
+                                      <p:tavLst>
+                                        <p:tav tm="0">
+                                          <p:val>
+                                            <p:strVal val="1+#ppt_h/2"/>
+                                          </p:val>
+                                        </p:tav>
+                                        <p:tav tm="100000">
+                                          <p:val>
+                                            <p:strVal val="#ppt_y"/>
+                                          </p:val>
+                                        </p:tav>
+                                      </p:tavLst>
+                                    </p:anim>
+                                  </p:childTnLst>
+                                </p:cTn>
+                              </p:par>
+                            </p:childTnLst>
+                          </p:cTn>
+                        </p:par>
+                      </p:childTnLst>
+                    </p:cTn>
+                  </p:par>
+                  <p:par>
+                    <p:cTn id="15" fill="hold">
+                      <p:stCondLst>
+                        <p:cond delay="indefinite"/>
+                      </p:stCondLst>
+                      <p:childTnLst>
+                        <p:par>
+                          <p:cTn id="16" fill="hold">
+                            <p:stCondLst>
+                              <p:cond delay="0"/>
+                            </p:stCondLst>
+                            <p:childTnLst>
+                              <p:par>
+                                <p:cTn id="17" presetID="2" presetClass="entr" presetSubtype="4" fill="hold" nodeType="clickEffect">
+                                  <p:stCondLst>
+                                    <p:cond delay="0"/>
+                                  </p:stCondLst>
+                                  <p:childTnLst>
+                                    <p:set>
+                                      <p:cBhvr>
+                                        <p:cTn id="18" dur="1" fill="hold">
+                                          <p:stCondLst>
+                                            <p:cond delay="0"/>
+                                          </p:stCondLst>
+                                        </p:cTn>
+                                        <p:tgtEl>
+                                          <p:spTgt spid="80898">
+                                            <p:txEl>
+                                              <p:pRg st="4" end="4"/>
+                                            </p:txEl>
+                                          </p:spTgt>
+                                        </p:tgtEl>
+                                        <p:attrNameLst>
+                                          <p:attrName>style.visibility</p:attrName>
+                                        </p:attrNameLst>
+                                      </p:cBhvr>
+                                      <p:to>
+                                        <p:strVal val="visible"/>
+                                      </p:to>
+                                    </p:set>
+                                    <p:anim calcmode="lin" valueType="num">
+                                      <p:cBhvr additive="base">
+                                        <p:cTn id="19" dur="500" fill="hold"/>
+                                        <p:tgtEl>
+                                          <p:spTgt spid="80898">
+                                            <p:txEl>
+                                              <p:pRg st="4" end="4"/>
+                                            </p:txEl>
+                                          </p:spTgt>
+                                        </p:tgtEl>
+                                        <p:attrNameLst>
+                                          <p:attrName>ppt_x</p:attrName>
+                                        </p:attrNameLst>
+                                      </p:cBhvr>
+                                      <p:tavLst>
+                                        <p:tav tm="0">
+                                          <p:val>
+                                            <p:strVal val="#ppt_x"/>
+                                          </p:val>
+                                        </p:tav>
+                                        <p:tav tm="100000">
+                                          <p:val>
+                                            <p:strVal val="#ppt_x"/>
+                                          </p:val>
+                                        </p:tav>
+                                      </p:tavLst>
+                                    </p:anim>
+                                    <p:anim calcmode="lin" valueType="num">
+                                      <p:cBhvr additive="base">
+                                        <p:cTn id="20" dur="500" fill="hold"/>
+                                        <p:tgtEl>
+                                          <p:spTgt spid="80898">
+                                            <p:txEl>
+                                              <p:pRg st="4" end="4"/>
+                                            </p:txEl>
+                                          </p:spTgt>
+                                        </p:tgtEl>
+                                        <p:attrNameLst>
+                                          <p:attrName>ppt_y</p:attrName>
+                                        </p:attrNameLst>
+                                      </p:cBhvr>
+                                      <p:tavLst>
+                                        <p:tav tm="0">
+                                          <p:val>
+                                            <p:strVal val="1+#ppt_h/2"/>
+                                          </p:val>
+                                        </p:tav>
+                                        <p:tav tm="100000">
+                                          <p:val>
+                                            <p:strVal val="#ppt_y"/>
+                                          </p:val>
+                                        </p:tav>
+                                      </p:tavLst>
+                                    </p:anim>
+                                  </p:childTnLst>
+                                </p:cTn>
+                              </p:par>
+                            </p:childTnLst>
+                          </p:cTn>
+                        </p:par>
+                      </p:childTnLst>
+                    </p:cTn>
+                  </p:par>
+                  <p:par>
+                    <p:cTn id="21" fill="hold">
+                      <p:stCondLst>
+                        <p:cond delay="indefinite"/>
+                      </p:stCondLst>
+                      <p:childTnLst>
+                        <p:par>
+                          <p:cTn id="22" fill="hold">
+                            <p:stCondLst>
+                              <p:cond delay="0"/>
+                            </p:stCondLst>
+                            <p:childTnLst>
+                              <p:par>
+                                <p:cTn id="23" presetID="2" presetClass="entr" presetSubtype="4" fill="hold" nodeType="clickEffect">
+                                  <p:stCondLst>
+                                    <p:cond delay="0"/>
+                                  </p:stCondLst>
+                                  <p:childTnLst>
+                                    <p:set>
+                                      <p:cBhvr>
+                                        <p:cTn id="24" dur="1" fill="hold">
+                                          <p:stCondLst>
+                                            <p:cond delay="0"/>
+                                          </p:stCondLst>
+                                        </p:cTn>
+                                        <p:tgtEl>
+                                          <p:spTgt spid="80898">
+                                            <p:txEl>
+                                              <p:pRg st="6" end="6"/>
+                                            </p:txEl>
+                                          </p:spTgt>
+                                        </p:tgtEl>
+                                        <p:attrNameLst>
+                                          <p:attrName>style.visibility</p:attrName>
+                                        </p:attrNameLst>
+                                      </p:cBhvr>
+                                      <p:to>
+                                        <p:strVal val="visible"/>
+                                      </p:to>
+                                    </p:set>
+                                    <p:anim calcmode="lin" valueType="num">
+                                      <p:cBhvr additive="base">
+                                        <p:cTn id="25" dur="500" fill="hold"/>
+                                        <p:tgtEl>
+                                          <p:spTgt spid="80898">
+                                            <p:txEl>
+                                              <p:pRg st="6" end="6"/>
+                                            </p:txEl>
+                                          </p:spTgt>
+                                        </p:tgtEl>
+                                        <p:attrNameLst>
+                                          <p:attrName>ppt_x</p:attrName>
+                                        </p:attrNameLst>
+                                      </p:cBhvr>
+                                      <p:tavLst>
+                                        <p:tav tm="0">
+                                          <p:val>
+                                            <p:strVal val="#ppt_x"/>
+                                          </p:val>
+                                        </p:tav>
+                                        <p:tav tm="100000">
+                                          <p:val>
+                                            <p:strVal val="#ppt_x"/>
+                                          </p:val>
+                                        </p:tav>
+                                      </p:tavLst>
+                                    </p:anim>
+                                    <p:anim calcmode="lin" valueType="num">
+                                      <p:cBhvr additive="base">
+                                        <p:cTn id="26" dur="500" fill="hold"/>
+                                        <p:tgtEl>
+                                          <p:spTgt spid="80898">
+                                            <p:txEl>
+                                              <p:pRg st="6" end="6"/>
+                                            </p:txEl>
+                                          </p:spTgt>
+                                        </p:tgtEl>
+                                        <p:attrNameLst>
+                                          <p:attrName>ppt_y</p:attrName>
+                                        </p:attrNameLst>
+                                      </p:cBhvr>
+                                      <p:tavLst>
+                                        <p:tav tm="0">
+                                          <p:val>
+                                            <p:strVal val="1+#ppt_h/2"/>
+                                          </p:val>
+                                        </p:tav>
+                                        <p:tav tm="100000">
+                                          <p:val>
+                                            <p:strVal val="#ppt_y"/>
+                                          </p:val>
+                                        </p:tav>
+                                      </p:tavLst>
+                                    </p:anim>
+                                  </p:childTnLst>
+                                </p:cTn>
+                              </p:par>
+                            </p:childTnLst>
+                          </p:cTn>
+                        </p:par>
+                      </p:childTnLst>
+                    </p:cTn>
+                  </p:par>
+                </p:childTnLst>
+              </p:cTn>
+              <p:prevCondLst>
+                <p:cond evt="onPrev" delay="0">
+                  <p:tgtEl>
+                    <p:sldTgt/>
+                  </p:tgtEl>
+                </p:cond>
+              </p:prevCondLst>
+              <p:nextCondLst>
+                <p:cond evt="onNext" delay="0">
+                  <p:tgtEl>
+                    <p:sldTgt/>
+                  </p:tgtEl>
+                </p:cond>
+              </p:nextCondLst>
+            </p:seq>
+          </p:childTnLst>
+        </p:cTn>
       </p:par>
     </p:tnLst>
   </p:timing>
@@ -5863,28 +7380,29 @@
       </p:sp>
       <p:pic>
         <p:nvPicPr>
-          <p:cNvPr id="3" name="Imagem 2"/>
+          <p:cNvPr id="3" name="Imagem 2">
+            <a:hlinkClick r:id="rId2" action="ppaction://hlinkfile"/>
+          </p:cNvPr>
           <p:cNvPicPr>
             <a:picLocks noChangeAspect="1"/>
           </p:cNvPicPr>
           <p:nvPr/>
         </p:nvPicPr>
-        <p:blipFill>
-          <a:blip r:embed="rId2">
+        <p:blipFill rotWithShape="1">
+          <a:blip r:embed="rId3">
             <a:extLst>
               <a:ext uri="{28A0092B-C50C-407E-A947-70E740481C1C}">
                 <a14:useLocalDpi xmlns:a14="http://schemas.microsoft.com/office/drawing/2010/main" val="0"/>
               </a:ext>
             </a:extLst>
           </a:blip>
-          <a:stretch>
-            <a:fillRect/>
-          </a:stretch>
+          <a:srcRect r="776"/>
+          <a:stretch/>
         </p:blipFill>
         <p:spPr>
           <a:xfrm>
-            <a:off x="0" y="2649914"/>
-            <a:ext cx="9144000" cy="1558171"/>
+            <a:off x="35496" y="2708920"/>
+            <a:ext cx="9073008" cy="1558171"/>
           </a:xfrm>
           <a:prstGeom prst="rect">
             <a:avLst/>
@@ -5901,6 +7419,9 @@
   <p:clrMapOvr>
     <a:masterClrMapping/>
   </p:clrMapOvr>
+  <p:transition spd="slow">
+    <p:cover dir="r"/>
+  </p:transition>
   <p:timing>
     <p:tnLst>
       <p:par>
@@ -5978,6 +7499,38 @@
           </a:p>
         </p:txBody>
       </p:sp>
+      <p:pic>
+        <p:nvPicPr>
+          <p:cNvPr id="2" name="Imagem 1">
+            <a:hlinkClick r:id="rId3" action="ppaction://hlinkfile"/>
+          </p:cNvPr>
+          <p:cNvPicPr>
+            <a:picLocks noChangeAspect="1"/>
+          </p:cNvPicPr>
+          <p:nvPr/>
+        </p:nvPicPr>
+        <p:blipFill>
+          <a:blip r:embed="rId4">
+            <a:extLst>
+              <a:ext uri="{28A0092B-C50C-407E-A947-70E740481C1C}">
+                <a14:useLocalDpi xmlns:a14="http://schemas.microsoft.com/office/drawing/2010/main" val="0"/>
+              </a:ext>
+            </a:extLst>
+          </a:blip>
+          <a:stretch>
+            <a:fillRect/>
+          </a:stretch>
+        </p:blipFill>
+        <p:spPr>
+          <a:xfrm>
+            <a:off x="917848" y="1052736"/>
+            <a:ext cx="7308304" cy="4672345"/>
+          </a:xfrm>
+          <a:prstGeom prst="rect">
+            <a:avLst/>
+          </a:prstGeom>
+        </p:spPr>
+      </p:pic>
     </p:spTree>
     <p:extLst>
       <p:ext uri="{BB962C8B-B14F-4D97-AF65-F5344CB8AC3E}">
@@ -5988,6 +7541,18 @@
   <p:clrMapOvr>
     <a:masterClrMapping/>
   </p:clrMapOvr>
+  <mc:AlternateContent xmlns:mc="http://schemas.openxmlformats.org/markup-compatibility/2006">
+    <mc:Choice xmlns:p15="http://schemas.microsoft.com/office/powerpoint/2012/main" Requires="p15">
+      <p:transition xmlns:p14="http://schemas.microsoft.com/office/powerpoint/2010/main" spd="slow" p14:dur="2000">
+        <p15:prstTrans prst="fallOver"/>
+      </p:transition>
+    </mc:Choice>
+    <mc:Fallback>
+      <p:transition spd="slow">
+        <p:fade/>
+      </p:transition>
+    </mc:Fallback>
+  </mc:AlternateContent>
   <p:timing>
     <p:tnLst>
       <p:par>
@@ -6073,11 +7638,55 @@
           </a:p>
         </p:txBody>
       </p:sp>
+      <p:pic>
+        <p:nvPicPr>
+          <p:cNvPr id="3" name="Imagem 2">
+            <a:hlinkClick r:id="rId2" action="ppaction://hlinkfile"/>
+          </p:cNvPr>
+          <p:cNvPicPr>
+            <a:picLocks noChangeAspect="1"/>
+          </p:cNvPicPr>
+          <p:nvPr/>
+        </p:nvPicPr>
+        <p:blipFill>
+          <a:blip r:embed="rId3">
+            <a:extLst>
+              <a:ext uri="{28A0092B-C50C-407E-A947-70E740481C1C}">
+                <a14:useLocalDpi xmlns:a14="http://schemas.microsoft.com/office/drawing/2010/main" val="0"/>
+              </a:ext>
+            </a:extLst>
+          </a:blip>
+          <a:stretch>
+            <a:fillRect/>
+          </a:stretch>
+        </p:blipFill>
+        <p:spPr>
+          <a:xfrm>
+            <a:off x="635536" y="2780928"/>
+            <a:ext cx="7872928" cy="862940"/>
+          </a:xfrm>
+          <a:prstGeom prst="rect">
+            <a:avLst/>
+          </a:prstGeom>
+        </p:spPr>
+      </p:pic>
     </p:spTree>
   </p:cSld>
   <p:clrMapOvr>
     <a:masterClrMapping/>
   </p:clrMapOvr>
+  <mc:AlternateContent xmlns:mc="http://schemas.openxmlformats.org/markup-compatibility/2006">
+    <mc:Choice xmlns:p15="http://schemas.microsoft.com/office/powerpoint/2012/main" Requires="p15">
+      <p:transition xmlns:p14="http://schemas.microsoft.com/office/powerpoint/2010/main" spd="slow" p14:dur="2000">
+        <p15:prstTrans prst="fallOver"/>
+      </p:transition>
+    </mc:Choice>
+    <mc:Fallback>
+      <p:transition spd="slow">
+        <p:fade/>
+      </p:transition>
+    </mc:Fallback>
+  </mc:AlternateContent>
   <p:timing>
     <p:tnLst>
       <p:par>
@@ -6155,6 +7764,458 @@
           </a:p>
         </p:txBody>
       </p:sp>
+      <p:graphicFrame>
+        <p:nvGraphicFramePr>
+          <p:cNvPr id="2" name="Tabela 1"/>
+          <p:cNvGraphicFramePr>
+            <a:graphicFrameLocks noGrp="1"/>
+          </p:cNvGraphicFramePr>
+          <p:nvPr>
+            <p:extLst>
+              <p:ext uri="{D42A27DB-BD31-4B8C-83A1-F6EECF244321}">
+                <p14:modId xmlns:p14="http://schemas.microsoft.com/office/powerpoint/2010/main" val="3737556051"/>
+              </p:ext>
+            </p:extLst>
+          </p:nvPr>
+        </p:nvGraphicFramePr>
+        <p:xfrm>
+          <a:off x="611560" y="1844824"/>
+          <a:ext cx="7992888" cy="3168352"/>
+        </p:xfrm>
+        <a:graphic>
+          <a:graphicData uri="http://schemas.openxmlformats.org/drawingml/2006/table">
+            <a:tbl>
+              <a:tblPr>
+                <a:effectLst>
+                  <a:reflection endPos="0" dist="50800" dir="5400000" sy="-100000" algn="bl" rotWithShape="0"/>
+                </a:effectLst>
+                <a:tableStyleId>{D7AC3CCA-C797-4891-BE02-D94E43425B78}</a:tableStyleId>
+              </a:tblPr>
+              <a:tblGrid>
+                <a:gridCol w="3637482"/>
+                <a:gridCol w="2406755"/>
+                <a:gridCol w="1948651"/>
+              </a:tblGrid>
+              <a:tr h="792088">
+                <a:tc>
+                  <a:txBody>
+                    <a:bodyPr/>
+                    <a:lstStyle/>
+                    <a:p>
+                      <a:pPr algn="ctr" rtl="0" fontAlgn="ctr"/>
+                      <a:r>
+                        <a:rPr lang="pt-BR" sz="1800" b="1" u="none" strike="noStrike" dirty="0">
+                          <a:solidFill>
+                            <a:schemeClr val="bg1"/>
+                          </a:solidFill>
+                          <a:effectLst/>
+                        </a:rPr>
+                        <a:t>Entregáveis</a:t>
+                      </a:r>
+                      <a:endParaRPr lang="pt-BR" sz="1800" b="1" i="0" u="none" strike="noStrike" dirty="0">
+                        <a:solidFill>
+                          <a:schemeClr val="bg1"/>
+                        </a:solidFill>
+                        <a:effectLst/>
+                        <a:latin typeface="Tahoma" panose="020B0604030504040204" pitchFamily="34" charset="0"/>
+                      </a:endParaRPr>
+                    </a:p>
+                  </a:txBody>
+                  <a:tcPr marL="9525" marR="9525" marT="9525" marB="0" anchor="ctr">
+                    <a:solidFill>
+                      <a:schemeClr val="tx1"/>
+                    </a:solidFill>
+                  </a:tcPr>
+                </a:tc>
+                <a:tc>
+                  <a:txBody>
+                    <a:bodyPr/>
+                    <a:lstStyle/>
+                    <a:p>
+                      <a:pPr algn="ctr" rtl="0" fontAlgn="b"/>
+                      <a:r>
+                        <a:rPr lang="pt-BR" sz="1800" b="1" u="none" strike="noStrike" dirty="0">
+                          <a:ln>
+                            <a:noFill/>
+                          </a:ln>
+                          <a:solidFill>
+                            <a:schemeClr val="bg1"/>
+                          </a:solidFill>
+                          <a:effectLst/>
+                        </a:rPr>
+                        <a:t>Data </a:t>
+                      </a:r>
+                      <a:r>
+                        <a:rPr lang="pt-BR" sz="1800" b="1" u="none" strike="noStrike" dirty="0" smtClean="0">
+                          <a:ln>
+                            <a:noFill/>
+                          </a:ln>
+                          <a:solidFill>
+                            <a:schemeClr val="bg1"/>
+                          </a:solidFill>
+                          <a:effectLst/>
+                        </a:rPr>
+                        <a:t>prevista </a:t>
+                      </a:r>
+                      <a:r>
+                        <a:rPr lang="pt-BR" sz="1800" b="1" u="none" strike="noStrike" dirty="0">
+                          <a:ln>
+                            <a:noFill/>
+                          </a:ln>
+                          <a:solidFill>
+                            <a:schemeClr val="bg1"/>
+                          </a:solidFill>
+                          <a:effectLst/>
+                        </a:rPr>
+                        <a:t>para conclusão</a:t>
+                      </a:r>
+                      <a:endParaRPr lang="pt-BR" sz="1800" b="1" i="0" u="none" strike="noStrike" dirty="0">
+                        <a:ln>
+                          <a:noFill/>
+                        </a:ln>
+                        <a:solidFill>
+                          <a:schemeClr val="bg1"/>
+                        </a:solidFill>
+                        <a:effectLst/>
+                        <a:latin typeface="Tahoma" panose="020B0604030504040204" pitchFamily="34" charset="0"/>
+                      </a:endParaRPr>
+                    </a:p>
+                  </a:txBody>
+                  <a:tcPr marL="9525" marR="9525" marT="9525" marB="0" anchor="ctr">
+                    <a:solidFill>
+                      <a:schemeClr val="tx1"/>
+                    </a:solidFill>
+                  </a:tcPr>
+                </a:tc>
+                <a:tc>
+                  <a:txBody>
+                    <a:bodyPr/>
+                    <a:lstStyle/>
+                    <a:p>
+                      <a:pPr algn="ctr" rtl="0" fontAlgn="ctr"/>
+                      <a:r>
+                        <a:rPr lang="pt-BR" sz="1800" b="1" u="none" strike="noStrike" dirty="0">
+                          <a:solidFill>
+                            <a:schemeClr val="bg1"/>
+                          </a:solidFill>
+                          <a:effectLst/>
+                        </a:rPr>
+                        <a:t>Situação dos entregáveis</a:t>
+                      </a:r>
+                      <a:endParaRPr lang="pt-BR" sz="1800" b="1" i="0" u="none" strike="noStrike" dirty="0">
+                        <a:solidFill>
+                          <a:schemeClr val="bg1"/>
+                        </a:solidFill>
+                        <a:effectLst/>
+                        <a:latin typeface="Tahoma" panose="020B0604030504040204" pitchFamily="34" charset="0"/>
+                      </a:endParaRPr>
+                    </a:p>
+                  </a:txBody>
+                  <a:tcPr marL="9525" marR="9525" marT="9525" marB="0" anchor="ctr">
+                    <a:solidFill>
+                      <a:schemeClr val="tx1"/>
+                    </a:solidFill>
+                  </a:tcPr>
+                </a:tc>
+              </a:tr>
+              <a:tr h="792088">
+                <a:tc>
+                  <a:txBody>
+                    <a:bodyPr/>
+                    <a:lstStyle/>
+                    <a:p>
+                      <a:pPr algn="ctr" rtl="0" fontAlgn="ctr"/>
+                      <a:r>
+                        <a:rPr lang="pt-BR" sz="1800" u="none" strike="noStrike" dirty="0">
+                          <a:effectLst/>
+                        </a:rPr>
+                        <a:t>Modulo Geração relatório de fluxo de exames</a:t>
+                      </a:r>
+                      <a:endParaRPr lang="pt-BR" sz="1800" b="0" i="0" u="none" strike="noStrike" dirty="0">
+                        <a:solidFill>
+                          <a:srgbClr val="000000"/>
+                        </a:solidFill>
+                        <a:effectLst/>
+                        <a:latin typeface="Tahoma" panose="020B0604030504040204" pitchFamily="34" charset="0"/>
+                      </a:endParaRPr>
+                    </a:p>
+                  </a:txBody>
+                  <a:tcPr marL="9525" marR="9525" marT="9525" marB="0" anchor="ctr">
+                    <a:solidFill>
+                      <a:schemeClr val="bg1">
+                        <a:lumMod val="95000"/>
+                      </a:schemeClr>
+                    </a:solidFill>
+                  </a:tcPr>
+                </a:tc>
+                <a:tc>
+                  <a:txBody>
+                    <a:bodyPr/>
+                    <a:lstStyle/>
+                    <a:p>
+                      <a:pPr algn="ctr" rtl="0" fontAlgn="ctr"/>
+                      <a:r>
+                        <a:rPr lang="pt-BR" sz="1800" u="none" strike="noStrike" dirty="0">
+                          <a:ln>
+                            <a:noFill/>
+                          </a:ln>
+                          <a:solidFill>
+                            <a:srgbClr val="FF0000"/>
+                          </a:solidFill>
+                          <a:effectLst/>
+                        </a:rPr>
+                        <a:t>09/04/2015</a:t>
+                      </a:r>
+                      <a:endParaRPr lang="pt-BR" sz="1800" b="0" i="0" u="none" strike="noStrike" dirty="0">
+                        <a:ln>
+                          <a:noFill/>
+                        </a:ln>
+                        <a:solidFill>
+                          <a:srgbClr val="FF0000"/>
+                        </a:solidFill>
+                        <a:effectLst/>
+                        <a:latin typeface="Tahoma" panose="020B0604030504040204" pitchFamily="34" charset="0"/>
+                      </a:endParaRPr>
+                    </a:p>
+                  </a:txBody>
+                  <a:tcPr marL="9525" marR="9525" marT="9525" marB="0" anchor="ctr">
+                    <a:solidFill>
+                      <a:schemeClr val="bg1">
+                        <a:lumMod val="95000"/>
+                      </a:schemeClr>
+                    </a:solidFill>
+                  </a:tcPr>
+                </a:tc>
+                <a:tc>
+                  <a:txBody>
+                    <a:bodyPr/>
+                    <a:lstStyle/>
+                    <a:p>
+                      <a:pPr algn="ctr" rtl="0" fontAlgn="ctr"/>
+                      <a:r>
+                        <a:rPr lang="pt-BR" sz="1800" u="none" strike="noStrike" dirty="0">
+                          <a:effectLst/>
+                        </a:rPr>
+                        <a:t>90%</a:t>
+                      </a:r>
+                      <a:endParaRPr lang="pt-BR" sz="1800" b="0" i="0" u="none" strike="noStrike" dirty="0">
+                        <a:solidFill>
+                          <a:srgbClr val="000000"/>
+                        </a:solidFill>
+                        <a:effectLst/>
+                        <a:latin typeface="Tahoma" panose="020B0604030504040204" pitchFamily="34" charset="0"/>
+                      </a:endParaRPr>
+                    </a:p>
+                  </a:txBody>
+                  <a:tcPr marL="9525" marR="9525" marT="9525" marB="0" anchor="ctr">
+                    <a:solidFill>
+                      <a:schemeClr val="bg1">
+                        <a:lumMod val="95000"/>
+                      </a:schemeClr>
+                    </a:solidFill>
+                  </a:tcPr>
+                </a:tc>
+              </a:tr>
+              <a:tr h="792088">
+                <a:tc>
+                  <a:txBody>
+                    <a:bodyPr/>
+                    <a:lstStyle/>
+                    <a:p>
+                      <a:pPr algn="ctr" rtl="0" fontAlgn="ctr"/>
+                      <a:r>
+                        <a:rPr lang="pt-BR" sz="1800" u="none" strike="noStrike" dirty="0">
+                          <a:effectLst/>
+                        </a:rPr>
+                        <a:t>Modulo Documentação do histórico dos pacientes</a:t>
+                      </a:r>
+                      <a:endParaRPr lang="pt-BR" sz="1800" b="0" i="0" u="none" strike="noStrike" dirty="0">
+                        <a:solidFill>
+                          <a:srgbClr val="000000"/>
+                        </a:solidFill>
+                        <a:effectLst/>
+                        <a:latin typeface="Tahoma" panose="020B0604030504040204" pitchFamily="34" charset="0"/>
+                      </a:endParaRPr>
+                    </a:p>
+                  </a:txBody>
+                  <a:tcPr marL="9525" marR="9525" marT="9525" marB="0" anchor="ctr">
+                    <a:solidFill>
+                      <a:schemeClr val="bg1">
+                        <a:lumMod val="95000"/>
+                      </a:schemeClr>
+                    </a:solidFill>
+                  </a:tcPr>
+                </a:tc>
+                <a:tc>
+                  <a:txBody>
+                    <a:bodyPr/>
+                    <a:lstStyle/>
+                    <a:p>
+                      <a:pPr algn="ctr" rtl="0" fontAlgn="ctr"/>
+                      <a:r>
+                        <a:rPr lang="pt-BR" sz="1800" u="none" strike="noStrike" dirty="0">
+                          <a:ln>
+                            <a:noFill/>
+                          </a:ln>
+                          <a:solidFill>
+                            <a:srgbClr val="FF0000"/>
+                          </a:solidFill>
+                          <a:effectLst/>
+                        </a:rPr>
+                        <a:t>16/04/2015</a:t>
+                      </a:r>
+                      <a:endParaRPr lang="pt-BR" sz="1800" b="0" i="0" u="none" strike="noStrike" dirty="0">
+                        <a:ln>
+                          <a:noFill/>
+                        </a:ln>
+                        <a:solidFill>
+                          <a:srgbClr val="FF0000"/>
+                        </a:solidFill>
+                        <a:effectLst/>
+                        <a:latin typeface="Tahoma" panose="020B0604030504040204" pitchFamily="34" charset="0"/>
+                      </a:endParaRPr>
+                    </a:p>
+                  </a:txBody>
+                  <a:tcPr marL="9525" marR="9525" marT="9525" marB="0" anchor="ctr">
+                    <a:solidFill>
+                      <a:schemeClr val="bg1">
+                        <a:lumMod val="95000"/>
+                      </a:schemeClr>
+                    </a:solidFill>
+                  </a:tcPr>
+                </a:tc>
+                <a:tc>
+                  <a:txBody>
+                    <a:bodyPr/>
+                    <a:lstStyle/>
+                    <a:p>
+                      <a:pPr algn="ctr" rtl="0" fontAlgn="ctr"/>
+                      <a:r>
+                        <a:rPr lang="pt-BR" sz="1800" u="none" strike="noStrike" dirty="0">
+                          <a:effectLst/>
+                        </a:rPr>
+                        <a:t>0%</a:t>
+                      </a:r>
+                      <a:endParaRPr lang="pt-BR" sz="1800" b="0" i="0" u="none" strike="noStrike" dirty="0">
+                        <a:solidFill>
+                          <a:srgbClr val="000000"/>
+                        </a:solidFill>
+                        <a:effectLst/>
+                        <a:latin typeface="Tahoma" panose="020B0604030504040204" pitchFamily="34" charset="0"/>
+                      </a:endParaRPr>
+                    </a:p>
+                  </a:txBody>
+                  <a:tcPr marL="9525" marR="9525" marT="9525" marB="0" anchor="ctr">
+                    <a:solidFill>
+                      <a:schemeClr val="bg1">
+                        <a:lumMod val="95000"/>
+                      </a:schemeClr>
+                    </a:solidFill>
+                  </a:tcPr>
+                </a:tc>
+              </a:tr>
+              <a:tr h="792088">
+                <a:tc>
+                  <a:txBody>
+                    <a:bodyPr/>
+                    <a:lstStyle/>
+                    <a:p>
+                      <a:pPr algn="ctr" rtl="0" fontAlgn="ctr"/>
+                      <a:r>
+                        <a:rPr lang="pt-BR" sz="1800" u="none" strike="noStrike" dirty="0">
+                          <a:effectLst/>
+                        </a:rPr>
+                        <a:t>Modulo Geração prontuário digital para o paciente</a:t>
+                      </a:r>
+                      <a:endParaRPr lang="pt-BR" sz="1800" b="0" i="0" u="none" strike="noStrike" dirty="0">
+                        <a:solidFill>
+                          <a:srgbClr val="000000"/>
+                        </a:solidFill>
+                        <a:effectLst/>
+                        <a:latin typeface="Tahoma" panose="020B0604030504040204" pitchFamily="34" charset="0"/>
+                      </a:endParaRPr>
+                    </a:p>
+                  </a:txBody>
+                  <a:tcPr marL="9525" marR="9525" marT="9525" marB="0" anchor="ctr">
+                    <a:solidFill>
+                      <a:schemeClr val="bg1">
+                        <a:lumMod val="95000"/>
+                      </a:schemeClr>
+                    </a:solidFill>
+                  </a:tcPr>
+                </a:tc>
+                <a:tc>
+                  <a:txBody>
+                    <a:bodyPr/>
+                    <a:lstStyle/>
+                    <a:p>
+                      <a:pPr algn="ctr" rtl="0" fontAlgn="ctr"/>
+                      <a:r>
+                        <a:rPr lang="pt-BR" sz="1800" u="none" strike="noStrike" dirty="0">
+                          <a:ln>
+                            <a:noFill/>
+                          </a:ln>
+                          <a:solidFill>
+                            <a:srgbClr val="FF0000"/>
+                          </a:solidFill>
+                          <a:effectLst/>
+                        </a:rPr>
+                        <a:t>04/05/2015</a:t>
+                      </a:r>
+                      <a:endParaRPr lang="pt-BR" sz="1800" b="0" i="0" u="none" strike="noStrike" dirty="0">
+                        <a:ln>
+                          <a:noFill/>
+                        </a:ln>
+                        <a:solidFill>
+                          <a:srgbClr val="FF0000"/>
+                        </a:solidFill>
+                        <a:effectLst/>
+                        <a:latin typeface="Tahoma" panose="020B0604030504040204" pitchFamily="34" charset="0"/>
+                      </a:endParaRPr>
+                    </a:p>
+                  </a:txBody>
+                  <a:tcPr marL="9525" marR="9525" marT="9525" marB="0" anchor="ctr">
+                    <a:solidFill>
+                      <a:schemeClr val="bg1">
+                        <a:lumMod val="95000"/>
+                      </a:schemeClr>
+                    </a:solidFill>
+                  </a:tcPr>
+                </a:tc>
+                <a:tc>
+                  <a:txBody>
+                    <a:bodyPr/>
+                    <a:lstStyle/>
+                    <a:p>
+                      <a:pPr algn="ctr" rtl="0" fontAlgn="ctr"/>
+                      <a:r>
+                        <a:rPr lang="pt-BR" sz="1800" u="none" strike="noStrike" dirty="0">
+                          <a:effectLst/>
+                        </a:rPr>
+                        <a:t>0%</a:t>
+                      </a:r>
+                      <a:endParaRPr lang="pt-BR" sz="1800" b="0" i="0" u="none" strike="noStrike" dirty="0">
+                        <a:solidFill>
+                          <a:srgbClr val="000000"/>
+                        </a:solidFill>
+                        <a:effectLst/>
+                        <a:latin typeface="Tahoma" panose="020B0604030504040204" pitchFamily="34" charset="0"/>
+                      </a:endParaRPr>
+                    </a:p>
+                  </a:txBody>
+                  <a:tcPr marL="9525" marR="9525" marT="9525" marB="0" anchor="ctr">
+                    <a:solidFill>
+                      <a:schemeClr val="bg1">
+                        <a:lumMod val="95000"/>
+                      </a:schemeClr>
+                    </a:solidFill>
+                  </a:tcPr>
+                </a:tc>
+              </a:tr>
+            </a:tbl>
+          </a:graphicData>
+        </a:graphic>
+      </p:graphicFrame>
     </p:spTree>
     <p:extLst>
       <p:ext uri="{BB962C8B-B14F-4D97-AF65-F5344CB8AC3E}">
@@ -6165,6 +8226,18 @@
   <p:clrMapOvr>
     <a:masterClrMapping/>
   </p:clrMapOvr>
+  <mc:AlternateContent xmlns:mc="http://schemas.openxmlformats.org/markup-compatibility/2006">
+    <mc:Choice xmlns:p15="http://schemas.microsoft.com/office/powerpoint/2012/main" Requires="p15">
+      <p:transition xmlns:p14="http://schemas.microsoft.com/office/powerpoint/2010/main" spd="slow" p14:dur="2000">
+        <p15:prstTrans prst="drape"/>
+      </p:transition>
+    </mc:Choice>
+    <mc:Fallback>
+      <p:transition spd="slow">
+        <p:fade/>
+      </p:transition>
+    </mc:Fallback>
+  </mc:AlternateContent>
   <p:timing>
     <p:tnLst>
       <p:par>
@@ -6250,6 +8323,740 @@
           </a:p>
         </p:txBody>
       </p:sp>
+      <p:graphicFrame>
+        <p:nvGraphicFramePr>
+          <p:cNvPr id="2" name="Tabela 1"/>
+          <p:cNvGraphicFramePr>
+            <a:graphicFrameLocks noGrp="1"/>
+          </p:cNvGraphicFramePr>
+          <p:nvPr>
+            <p:extLst>
+              <p:ext uri="{D42A27DB-BD31-4B8C-83A1-F6EECF244321}">
+                <p14:modId xmlns:p14="http://schemas.microsoft.com/office/powerpoint/2010/main" val="440909266"/>
+              </p:ext>
+            </p:extLst>
+          </p:nvPr>
+        </p:nvGraphicFramePr>
+        <p:xfrm>
+          <a:off x="539552" y="1340772"/>
+          <a:ext cx="7992888" cy="1440160"/>
+        </p:xfrm>
+        <a:graphic>
+          <a:graphicData uri="http://schemas.openxmlformats.org/drawingml/2006/table">
+            <a:tbl>
+              <a:tblPr>
+                <a:tableStyleId>{D7AC3CCA-C797-4891-BE02-D94E43425B78}</a:tableStyleId>
+              </a:tblPr>
+              <a:tblGrid>
+                <a:gridCol w="5074137"/>
+                <a:gridCol w="2918751"/>
+              </a:tblGrid>
+              <a:tr h="360040">
+                <a:tc>
+                  <a:txBody>
+                    <a:bodyPr/>
+                    <a:lstStyle/>
+                    <a:p>
+                      <a:pPr algn="ctr" rtl="0" fontAlgn="ctr"/>
+                      <a:r>
+                        <a:rPr lang="pt-BR" sz="1800" u="none" strike="noStrike" dirty="0">
+                          <a:solidFill>
+                            <a:schemeClr val="bg1"/>
+                          </a:solidFill>
+                          <a:effectLst/>
+                        </a:rPr>
+                        <a:t>Entregáveis</a:t>
+                      </a:r>
+                      <a:endParaRPr lang="pt-BR" sz="1800" b="1" i="0" u="none" strike="noStrike" dirty="0">
+                        <a:solidFill>
+                          <a:schemeClr val="bg1"/>
+                        </a:solidFill>
+                        <a:effectLst/>
+                        <a:latin typeface="Tahoma" panose="020B0604030504040204" pitchFamily="34" charset="0"/>
+                      </a:endParaRPr>
+                    </a:p>
+                  </a:txBody>
+                  <a:tcPr marL="9525" marR="9525" marT="9525" marB="0" anchor="ctr">
+                    <a:solidFill>
+                      <a:schemeClr val="tx1"/>
+                    </a:solidFill>
+                  </a:tcPr>
+                </a:tc>
+                <a:tc>
+                  <a:txBody>
+                    <a:bodyPr/>
+                    <a:lstStyle/>
+                    <a:p>
+                      <a:pPr algn="ctr" rtl="0" fontAlgn="ctr"/>
+                      <a:r>
+                        <a:rPr lang="pt-BR" sz="1800" u="none" strike="noStrike" dirty="0">
+                          <a:solidFill>
+                            <a:schemeClr val="bg1"/>
+                          </a:solidFill>
+                          <a:effectLst/>
+                        </a:rPr>
+                        <a:t>Indicadores de Qualidade</a:t>
+                      </a:r>
+                      <a:endParaRPr lang="pt-BR" sz="1800" b="1" i="0" u="none" strike="noStrike" dirty="0">
+                        <a:solidFill>
+                          <a:schemeClr val="bg1"/>
+                        </a:solidFill>
+                        <a:effectLst/>
+                        <a:latin typeface="Tahoma" panose="020B0604030504040204" pitchFamily="34" charset="0"/>
+                      </a:endParaRPr>
+                    </a:p>
+                  </a:txBody>
+                  <a:tcPr marL="9525" marR="9525" marT="9525" marB="0" anchor="ctr">
+                    <a:solidFill>
+                      <a:schemeClr val="tx1"/>
+                    </a:solidFill>
+                  </a:tcPr>
+                </a:tc>
+              </a:tr>
+              <a:tr h="360040">
+                <a:tc>
+                  <a:txBody>
+                    <a:bodyPr/>
+                    <a:lstStyle/>
+                    <a:p>
+                      <a:pPr algn="ctr" rtl="0" fontAlgn="ctr"/>
+                      <a:r>
+                        <a:rPr lang="pt-BR" sz="1800" u="none" strike="noStrike" dirty="0">
+                          <a:effectLst/>
+                        </a:rPr>
+                        <a:t>Modulo Geração relatório de fluxo de exames</a:t>
+                      </a:r>
+                      <a:endParaRPr lang="pt-BR" sz="1800" b="0" i="0" u="none" strike="noStrike" dirty="0">
+                        <a:solidFill>
+                          <a:srgbClr val="000000"/>
+                        </a:solidFill>
+                        <a:effectLst/>
+                        <a:latin typeface="Tahoma" panose="020B0604030504040204" pitchFamily="34" charset="0"/>
+                      </a:endParaRPr>
+                    </a:p>
+                  </a:txBody>
+                  <a:tcPr marL="9525" marR="9525" marT="9525" marB="0" anchor="ctr">
+                    <a:solidFill>
+                      <a:schemeClr val="bg1">
+                        <a:lumMod val="95000"/>
+                      </a:schemeClr>
+                    </a:solidFill>
+                  </a:tcPr>
+                </a:tc>
+                <a:tc>
+                  <a:txBody>
+                    <a:bodyPr/>
+                    <a:lstStyle/>
+                    <a:p>
+                      <a:pPr algn="ctr" rtl="0" fontAlgn="ctr"/>
+                      <a:r>
+                        <a:rPr lang="pt-BR" sz="1800" u="none" strike="noStrike" dirty="0">
+                          <a:solidFill>
+                            <a:srgbClr val="FF0000"/>
+                          </a:solidFill>
+                          <a:effectLst/>
+                        </a:rPr>
+                        <a:t>4</a:t>
+                      </a:r>
+                      <a:endParaRPr lang="pt-BR" sz="1800" b="0" i="0" u="none" strike="noStrike" dirty="0">
+                        <a:solidFill>
+                          <a:srgbClr val="FF0000"/>
+                        </a:solidFill>
+                        <a:effectLst/>
+                        <a:latin typeface="Tahoma" panose="020B0604030504040204" pitchFamily="34" charset="0"/>
+                      </a:endParaRPr>
+                    </a:p>
+                  </a:txBody>
+                  <a:tcPr marL="9525" marR="9525" marT="9525" marB="0" anchor="ctr">
+                    <a:solidFill>
+                      <a:schemeClr val="bg1">
+                        <a:lumMod val="95000"/>
+                      </a:schemeClr>
+                    </a:solidFill>
+                  </a:tcPr>
+                </a:tc>
+              </a:tr>
+              <a:tr h="360040">
+                <a:tc>
+                  <a:txBody>
+                    <a:bodyPr/>
+                    <a:lstStyle/>
+                    <a:p>
+                      <a:pPr algn="ctr" rtl="0" fontAlgn="ctr"/>
+                      <a:r>
+                        <a:rPr lang="pt-BR" sz="1800" u="none" strike="noStrike" dirty="0">
+                          <a:effectLst/>
+                        </a:rPr>
+                        <a:t>Modulo Documentação do histórico dos pacientes</a:t>
+                      </a:r>
+                      <a:endParaRPr lang="pt-BR" sz="1800" b="0" i="0" u="none" strike="noStrike" dirty="0">
+                        <a:solidFill>
+                          <a:srgbClr val="000000"/>
+                        </a:solidFill>
+                        <a:effectLst/>
+                        <a:latin typeface="Tahoma" panose="020B0604030504040204" pitchFamily="34" charset="0"/>
+                      </a:endParaRPr>
+                    </a:p>
+                  </a:txBody>
+                  <a:tcPr marL="9525" marR="9525" marT="9525" marB="0" anchor="ctr">
+                    <a:solidFill>
+                      <a:schemeClr val="bg1">
+                        <a:lumMod val="95000"/>
+                      </a:schemeClr>
+                    </a:solidFill>
+                  </a:tcPr>
+                </a:tc>
+                <a:tc>
+                  <a:txBody>
+                    <a:bodyPr/>
+                    <a:lstStyle/>
+                    <a:p>
+                      <a:pPr algn="ctr" rtl="0" fontAlgn="ctr"/>
+                      <a:r>
+                        <a:rPr lang="pt-BR" sz="1800" u="none" strike="noStrike" dirty="0">
+                          <a:effectLst/>
+                        </a:rPr>
+                        <a:t>0</a:t>
+                      </a:r>
+                      <a:endParaRPr lang="pt-BR" sz="1800" b="0" i="0" u="none" strike="noStrike" dirty="0">
+                        <a:solidFill>
+                          <a:srgbClr val="000000"/>
+                        </a:solidFill>
+                        <a:effectLst/>
+                        <a:latin typeface="Tahoma" panose="020B0604030504040204" pitchFamily="34" charset="0"/>
+                      </a:endParaRPr>
+                    </a:p>
+                  </a:txBody>
+                  <a:tcPr marL="9525" marR="9525" marT="9525" marB="0" anchor="ctr">
+                    <a:solidFill>
+                      <a:schemeClr val="bg1">
+                        <a:lumMod val="95000"/>
+                      </a:schemeClr>
+                    </a:solidFill>
+                  </a:tcPr>
+                </a:tc>
+              </a:tr>
+              <a:tr h="360040">
+                <a:tc>
+                  <a:txBody>
+                    <a:bodyPr/>
+                    <a:lstStyle/>
+                    <a:p>
+                      <a:pPr algn="ctr" rtl="0" fontAlgn="ctr"/>
+                      <a:r>
+                        <a:rPr lang="pt-BR" sz="1800" u="none" strike="noStrike" dirty="0">
+                          <a:effectLst/>
+                        </a:rPr>
+                        <a:t>Modulo Geração prontuário digital para o paciente</a:t>
+                      </a:r>
+                      <a:endParaRPr lang="pt-BR" sz="1800" b="0" i="0" u="none" strike="noStrike" dirty="0">
+                        <a:solidFill>
+                          <a:srgbClr val="000000"/>
+                        </a:solidFill>
+                        <a:effectLst/>
+                        <a:latin typeface="Tahoma" panose="020B0604030504040204" pitchFamily="34" charset="0"/>
+                      </a:endParaRPr>
+                    </a:p>
+                  </a:txBody>
+                  <a:tcPr marL="9525" marR="9525" marT="9525" marB="0" anchor="ctr">
+                    <a:solidFill>
+                      <a:schemeClr val="bg1">
+                        <a:lumMod val="95000"/>
+                      </a:schemeClr>
+                    </a:solidFill>
+                  </a:tcPr>
+                </a:tc>
+                <a:tc>
+                  <a:txBody>
+                    <a:bodyPr/>
+                    <a:lstStyle/>
+                    <a:p>
+                      <a:pPr algn="ctr" rtl="0" fontAlgn="ctr"/>
+                      <a:r>
+                        <a:rPr lang="pt-BR" sz="1800" u="none" strike="noStrike" dirty="0">
+                          <a:effectLst/>
+                        </a:rPr>
+                        <a:t>0</a:t>
+                      </a:r>
+                      <a:endParaRPr lang="pt-BR" sz="1800" b="0" i="0" u="none" strike="noStrike" dirty="0">
+                        <a:solidFill>
+                          <a:srgbClr val="000000"/>
+                        </a:solidFill>
+                        <a:effectLst/>
+                        <a:latin typeface="Tahoma" panose="020B0604030504040204" pitchFamily="34" charset="0"/>
+                      </a:endParaRPr>
+                    </a:p>
+                  </a:txBody>
+                  <a:tcPr marL="9525" marR="9525" marT="9525" marB="0" anchor="ctr">
+                    <a:solidFill>
+                      <a:schemeClr val="bg1">
+                        <a:lumMod val="95000"/>
+                      </a:schemeClr>
+                    </a:solidFill>
+                  </a:tcPr>
+                </a:tc>
+              </a:tr>
+            </a:tbl>
+          </a:graphicData>
+        </a:graphic>
+      </p:graphicFrame>
+      <p:graphicFrame>
+        <p:nvGraphicFramePr>
+          <p:cNvPr id="3" name="Tabela 2"/>
+          <p:cNvGraphicFramePr>
+            <a:graphicFrameLocks noGrp="1"/>
+          </p:cNvGraphicFramePr>
+          <p:nvPr>
+            <p:extLst>
+              <p:ext uri="{D42A27DB-BD31-4B8C-83A1-F6EECF244321}">
+                <p14:modId xmlns:p14="http://schemas.microsoft.com/office/powerpoint/2010/main" val="972777113"/>
+              </p:ext>
+            </p:extLst>
+          </p:nvPr>
+        </p:nvGraphicFramePr>
+        <p:xfrm>
+          <a:off x="539552" y="3356992"/>
+          <a:ext cx="7992888" cy="2520280"/>
+        </p:xfrm>
+        <a:graphic>
+          <a:graphicData uri="http://schemas.openxmlformats.org/drawingml/2006/table">
+            <a:tbl>
+              <a:tblPr>
+                <a:tableStyleId>{D7AC3CCA-C797-4891-BE02-D94E43425B78}</a:tableStyleId>
+              </a:tblPr>
+              <a:tblGrid>
+                <a:gridCol w="5074137"/>
+                <a:gridCol w="2918751"/>
+              </a:tblGrid>
+              <a:tr h="360040">
+                <a:tc>
+                  <a:txBody>
+                    <a:bodyPr/>
+                    <a:lstStyle/>
+                    <a:p>
+                      <a:pPr algn="ctr" rtl="0" fontAlgn="ctr"/>
+                      <a:r>
+                        <a:rPr lang="pt-BR" sz="1800" u="none" strike="noStrike" dirty="0">
+                          <a:solidFill>
+                            <a:schemeClr val="bg1"/>
+                          </a:solidFill>
+                          <a:effectLst/>
+                        </a:rPr>
+                        <a:t>Indicadores de Qualidade</a:t>
+                      </a:r>
+                      <a:endParaRPr lang="pt-BR" sz="1800" b="1" i="0" u="none" strike="noStrike" dirty="0">
+                        <a:solidFill>
+                          <a:schemeClr val="bg1"/>
+                        </a:solidFill>
+                        <a:effectLst/>
+                        <a:latin typeface="Tahoma" panose="020B0604030504040204" pitchFamily="34" charset="0"/>
+                      </a:endParaRPr>
+                    </a:p>
+                  </a:txBody>
+                  <a:tcPr marL="9525" marR="9525" marT="9525" marB="0" anchor="ctr">
+                    <a:solidFill>
+                      <a:schemeClr val="tx1"/>
+                    </a:solidFill>
+                  </a:tcPr>
+                </a:tc>
+                <a:tc>
+                  <a:txBody>
+                    <a:bodyPr/>
+                    <a:lstStyle/>
+                    <a:p>
+                      <a:pPr algn="ctr" rtl="0" fontAlgn="ctr"/>
+                      <a:r>
+                        <a:rPr lang="pt-BR" sz="1800" u="none" strike="noStrike" dirty="0">
+                          <a:solidFill>
+                            <a:schemeClr val="bg1"/>
+                          </a:solidFill>
+                          <a:effectLst/>
+                        </a:rPr>
+                        <a:t>Descrição</a:t>
+                      </a:r>
+                      <a:endParaRPr lang="pt-BR" sz="1800" b="1" i="0" u="none" strike="noStrike" dirty="0">
+                        <a:solidFill>
+                          <a:schemeClr val="bg1"/>
+                        </a:solidFill>
+                        <a:effectLst/>
+                        <a:latin typeface="Tahoma" panose="020B0604030504040204" pitchFamily="34" charset="0"/>
+                      </a:endParaRPr>
+                    </a:p>
+                  </a:txBody>
+                  <a:tcPr marL="9525" marR="9525" marT="9525" marB="0" anchor="ctr">
+                    <a:solidFill>
+                      <a:schemeClr val="tx1"/>
+                    </a:solidFill>
+                  </a:tcPr>
+                </a:tc>
+              </a:tr>
+              <a:tr h="360040">
+                <a:tc>
+                  <a:txBody>
+                    <a:bodyPr/>
+                    <a:lstStyle/>
+                    <a:p>
+                      <a:pPr algn="ctr" rtl="0" fontAlgn="ctr"/>
+                      <a:r>
+                        <a:rPr lang="pt-BR" sz="1800" u="none" strike="noStrike" dirty="0">
+                          <a:effectLst/>
+                        </a:rPr>
+                        <a:t>0</a:t>
+                      </a:r>
+                      <a:endParaRPr lang="pt-BR" sz="1800" b="0" i="0" u="none" strike="noStrike" dirty="0">
+                        <a:solidFill>
+                          <a:srgbClr val="000000"/>
+                        </a:solidFill>
+                        <a:effectLst/>
+                        <a:latin typeface="Tahoma" panose="020B0604030504040204" pitchFamily="34" charset="0"/>
+                      </a:endParaRPr>
+                    </a:p>
+                  </a:txBody>
+                  <a:tcPr marL="9525" marR="9525" marT="9525" marB="0" anchor="ctr">
+                    <a:solidFill>
+                      <a:schemeClr val="bg1">
+                        <a:lumMod val="95000"/>
+                      </a:schemeClr>
+                    </a:solidFill>
+                  </a:tcPr>
+                </a:tc>
+                <a:tc>
+                  <a:txBody>
+                    <a:bodyPr/>
+                    <a:lstStyle/>
+                    <a:p>
+                      <a:pPr algn="ctr" rtl="0" fontAlgn="ctr"/>
+                      <a:r>
+                        <a:rPr lang="pt-BR" sz="1800" u="none" strike="noStrike" dirty="0">
+                          <a:effectLst/>
+                        </a:rPr>
+                        <a:t>Não implementado</a:t>
+                      </a:r>
+                      <a:endParaRPr lang="pt-BR" sz="1800" b="0" i="0" u="none" strike="noStrike" dirty="0">
+                        <a:solidFill>
+                          <a:srgbClr val="000000"/>
+                        </a:solidFill>
+                        <a:effectLst/>
+                        <a:latin typeface="Tahoma" panose="020B0604030504040204" pitchFamily="34" charset="0"/>
+                      </a:endParaRPr>
+                    </a:p>
+                  </a:txBody>
+                  <a:tcPr marL="9525" marR="9525" marT="9525" marB="0" anchor="ctr">
+                    <a:solidFill>
+                      <a:schemeClr val="bg1">
+                        <a:lumMod val="95000"/>
+                      </a:schemeClr>
+                    </a:solidFill>
+                  </a:tcPr>
+                </a:tc>
+              </a:tr>
+              <a:tr h="360040">
+                <a:tc>
+                  <a:txBody>
+                    <a:bodyPr/>
+                    <a:lstStyle/>
+                    <a:p>
+                      <a:pPr algn="ctr" rtl="0" fontAlgn="ctr"/>
+                      <a:r>
+                        <a:rPr lang="pt-BR" sz="1800" u="none" strike="noStrike" dirty="0">
+                          <a:effectLst/>
+                        </a:rPr>
+                        <a:t>1</a:t>
+                      </a:r>
+                      <a:endParaRPr lang="pt-BR" sz="1800" b="0" i="0" u="none" strike="noStrike" dirty="0">
+                        <a:solidFill>
+                          <a:srgbClr val="000000"/>
+                        </a:solidFill>
+                        <a:effectLst/>
+                        <a:latin typeface="Tahoma" panose="020B0604030504040204" pitchFamily="34" charset="0"/>
+                      </a:endParaRPr>
+                    </a:p>
+                  </a:txBody>
+                  <a:tcPr marL="9525" marR="9525" marT="9525" marB="0" anchor="ctr">
+                    <a:solidFill>
+                      <a:schemeClr val="bg1">
+                        <a:lumMod val="95000"/>
+                      </a:schemeClr>
+                    </a:solidFill>
+                  </a:tcPr>
+                </a:tc>
+                <a:tc>
+                  <a:txBody>
+                    <a:bodyPr/>
+                    <a:lstStyle/>
+                    <a:p>
+                      <a:pPr algn="ctr" rtl="0" fontAlgn="ctr"/>
+                      <a:r>
+                        <a:rPr lang="pt-BR" sz="1800" u="none" strike="noStrike" dirty="0">
+                          <a:effectLst/>
+                        </a:rPr>
+                        <a:t>Péssimo</a:t>
+                      </a:r>
+                      <a:endParaRPr lang="pt-BR" sz="1800" b="0" i="0" u="none" strike="noStrike" dirty="0">
+                        <a:solidFill>
+                          <a:srgbClr val="000000"/>
+                        </a:solidFill>
+                        <a:effectLst/>
+                        <a:latin typeface="Tahoma" panose="020B0604030504040204" pitchFamily="34" charset="0"/>
+                      </a:endParaRPr>
+                    </a:p>
+                  </a:txBody>
+                  <a:tcPr marL="9525" marR="9525" marT="9525" marB="0" anchor="ctr">
+                    <a:solidFill>
+                      <a:schemeClr val="bg1">
+                        <a:lumMod val="95000"/>
+                      </a:schemeClr>
+                    </a:solidFill>
+                  </a:tcPr>
+                </a:tc>
+              </a:tr>
+              <a:tr h="360040">
+                <a:tc>
+                  <a:txBody>
+                    <a:bodyPr/>
+                    <a:lstStyle/>
+                    <a:p>
+                      <a:pPr algn="ctr" rtl="0" fontAlgn="ctr"/>
+                      <a:r>
+                        <a:rPr lang="pt-BR" sz="1800" u="none" strike="noStrike" dirty="0">
+                          <a:effectLst/>
+                        </a:rPr>
+                        <a:t>2</a:t>
+                      </a:r>
+                      <a:endParaRPr lang="pt-BR" sz="1800" b="0" i="0" u="none" strike="noStrike" dirty="0">
+                        <a:solidFill>
+                          <a:srgbClr val="000000"/>
+                        </a:solidFill>
+                        <a:effectLst/>
+                        <a:latin typeface="Tahoma" panose="020B0604030504040204" pitchFamily="34" charset="0"/>
+                      </a:endParaRPr>
+                    </a:p>
+                  </a:txBody>
+                  <a:tcPr marL="9525" marR="9525" marT="9525" marB="0" anchor="ctr">
+                    <a:solidFill>
+                      <a:schemeClr val="bg1">
+                        <a:lumMod val="95000"/>
+                      </a:schemeClr>
+                    </a:solidFill>
+                  </a:tcPr>
+                </a:tc>
+                <a:tc>
+                  <a:txBody>
+                    <a:bodyPr/>
+                    <a:lstStyle/>
+                    <a:p>
+                      <a:pPr algn="ctr" rtl="0" fontAlgn="ctr"/>
+                      <a:r>
+                        <a:rPr lang="pt-BR" sz="1800" u="none" strike="noStrike" dirty="0">
+                          <a:effectLst/>
+                        </a:rPr>
+                        <a:t>Ruim</a:t>
+                      </a:r>
+                      <a:endParaRPr lang="pt-BR" sz="1800" b="0" i="0" u="none" strike="noStrike" dirty="0">
+                        <a:solidFill>
+                          <a:srgbClr val="000000"/>
+                        </a:solidFill>
+                        <a:effectLst/>
+                        <a:latin typeface="Tahoma" panose="020B0604030504040204" pitchFamily="34" charset="0"/>
+                      </a:endParaRPr>
+                    </a:p>
+                  </a:txBody>
+                  <a:tcPr marL="9525" marR="9525" marT="9525" marB="0" anchor="ctr">
+                    <a:solidFill>
+                      <a:schemeClr val="bg1">
+                        <a:lumMod val="95000"/>
+                      </a:schemeClr>
+                    </a:solidFill>
+                  </a:tcPr>
+                </a:tc>
+              </a:tr>
+              <a:tr h="360040">
+                <a:tc>
+                  <a:txBody>
+                    <a:bodyPr/>
+                    <a:lstStyle/>
+                    <a:p>
+                      <a:pPr algn="ctr" rtl="0" fontAlgn="ctr"/>
+                      <a:r>
+                        <a:rPr lang="pt-BR" sz="1800" u="none" strike="noStrike" dirty="0">
+                          <a:effectLst/>
+                        </a:rPr>
+                        <a:t>3</a:t>
+                      </a:r>
+                      <a:endParaRPr lang="pt-BR" sz="1800" b="0" i="0" u="none" strike="noStrike" dirty="0">
+                        <a:solidFill>
+                          <a:srgbClr val="000000"/>
+                        </a:solidFill>
+                        <a:effectLst/>
+                        <a:latin typeface="Tahoma" panose="020B0604030504040204" pitchFamily="34" charset="0"/>
+                      </a:endParaRPr>
+                    </a:p>
+                  </a:txBody>
+                  <a:tcPr marL="9525" marR="9525" marT="9525" marB="0" anchor="ctr">
+                    <a:solidFill>
+                      <a:schemeClr val="bg1">
+                        <a:lumMod val="95000"/>
+                      </a:schemeClr>
+                    </a:solidFill>
+                  </a:tcPr>
+                </a:tc>
+                <a:tc>
+                  <a:txBody>
+                    <a:bodyPr/>
+                    <a:lstStyle/>
+                    <a:p>
+                      <a:pPr algn="ctr" rtl="0" fontAlgn="ctr"/>
+                      <a:r>
+                        <a:rPr lang="pt-BR" sz="1800" u="none" strike="noStrike" dirty="0">
+                          <a:effectLst/>
+                        </a:rPr>
+                        <a:t>Médio</a:t>
+                      </a:r>
+                      <a:endParaRPr lang="pt-BR" sz="1800" b="0" i="0" u="none" strike="noStrike" dirty="0">
+                        <a:solidFill>
+                          <a:srgbClr val="000000"/>
+                        </a:solidFill>
+                        <a:effectLst/>
+                        <a:latin typeface="Tahoma" panose="020B0604030504040204" pitchFamily="34" charset="0"/>
+                      </a:endParaRPr>
+                    </a:p>
+                  </a:txBody>
+                  <a:tcPr marL="9525" marR="9525" marT="9525" marB="0" anchor="ctr">
+                    <a:solidFill>
+                      <a:schemeClr val="bg1">
+                        <a:lumMod val="95000"/>
+                      </a:schemeClr>
+                    </a:solidFill>
+                  </a:tcPr>
+                </a:tc>
+              </a:tr>
+              <a:tr h="360040">
+                <a:tc>
+                  <a:txBody>
+                    <a:bodyPr/>
+                    <a:lstStyle/>
+                    <a:p>
+                      <a:pPr algn="ctr" rtl="0" fontAlgn="ctr"/>
+                      <a:r>
+                        <a:rPr lang="pt-BR" sz="1800" u="none" strike="noStrike" dirty="0">
+                          <a:solidFill>
+                            <a:srgbClr val="FF0000"/>
+                          </a:solidFill>
+                          <a:effectLst/>
+                        </a:rPr>
+                        <a:t>4</a:t>
+                      </a:r>
+                      <a:endParaRPr lang="pt-BR" sz="1800" b="0" i="0" u="none" strike="noStrike" dirty="0">
+                        <a:solidFill>
+                          <a:srgbClr val="FF0000"/>
+                        </a:solidFill>
+                        <a:effectLst/>
+                        <a:latin typeface="Tahoma" panose="020B0604030504040204" pitchFamily="34" charset="0"/>
+                      </a:endParaRPr>
+                    </a:p>
+                  </a:txBody>
+                  <a:tcPr marL="9525" marR="9525" marT="9525" marB="0" anchor="ctr">
+                    <a:solidFill>
+                      <a:schemeClr val="bg1">
+                        <a:lumMod val="95000"/>
+                      </a:schemeClr>
+                    </a:solidFill>
+                  </a:tcPr>
+                </a:tc>
+                <a:tc>
+                  <a:txBody>
+                    <a:bodyPr/>
+                    <a:lstStyle/>
+                    <a:p>
+                      <a:pPr algn="ctr" rtl="0" fontAlgn="ctr"/>
+                      <a:r>
+                        <a:rPr lang="pt-BR" sz="1800" u="none" strike="noStrike" dirty="0">
+                          <a:effectLst/>
+                        </a:rPr>
+                        <a:t>Bom</a:t>
+                      </a:r>
+                      <a:endParaRPr lang="pt-BR" sz="1800" b="0" i="0" u="none" strike="noStrike" dirty="0">
+                        <a:solidFill>
+                          <a:srgbClr val="000000"/>
+                        </a:solidFill>
+                        <a:effectLst/>
+                        <a:latin typeface="Tahoma" panose="020B0604030504040204" pitchFamily="34" charset="0"/>
+                      </a:endParaRPr>
+                    </a:p>
+                  </a:txBody>
+                  <a:tcPr marL="9525" marR="9525" marT="9525" marB="0" anchor="ctr">
+                    <a:solidFill>
+                      <a:schemeClr val="bg1">
+                        <a:lumMod val="95000"/>
+                      </a:schemeClr>
+                    </a:solidFill>
+                  </a:tcPr>
+                </a:tc>
+              </a:tr>
+              <a:tr h="360040">
+                <a:tc>
+                  <a:txBody>
+                    <a:bodyPr/>
+                    <a:lstStyle/>
+                    <a:p>
+                      <a:pPr algn="ctr" rtl="0" fontAlgn="ctr"/>
+                      <a:r>
+                        <a:rPr lang="pt-BR" sz="1800" u="none" strike="noStrike" dirty="0">
+                          <a:effectLst/>
+                        </a:rPr>
+                        <a:t>5</a:t>
+                      </a:r>
+                      <a:endParaRPr lang="pt-BR" sz="1800" b="0" i="0" u="none" strike="noStrike" dirty="0">
+                        <a:solidFill>
+                          <a:srgbClr val="000000"/>
+                        </a:solidFill>
+                        <a:effectLst/>
+                        <a:latin typeface="Tahoma" panose="020B0604030504040204" pitchFamily="34" charset="0"/>
+                      </a:endParaRPr>
+                    </a:p>
+                  </a:txBody>
+                  <a:tcPr marL="9525" marR="9525" marT="9525" marB="0" anchor="ctr">
+                    <a:solidFill>
+                      <a:schemeClr val="bg1">
+                        <a:lumMod val="95000"/>
+                      </a:schemeClr>
+                    </a:solidFill>
+                  </a:tcPr>
+                </a:tc>
+                <a:tc>
+                  <a:txBody>
+                    <a:bodyPr/>
+                    <a:lstStyle/>
+                    <a:p>
+                      <a:pPr algn="ctr" rtl="0" fontAlgn="ctr"/>
+                      <a:r>
+                        <a:rPr lang="pt-BR" sz="1800" u="none" strike="noStrike" dirty="0">
+                          <a:effectLst/>
+                        </a:rPr>
+                        <a:t>Ótimo</a:t>
+                      </a:r>
+                      <a:endParaRPr lang="pt-BR" sz="1800" b="0" i="0" u="none" strike="noStrike" dirty="0">
+                        <a:solidFill>
+                          <a:srgbClr val="000000"/>
+                        </a:solidFill>
+                        <a:effectLst/>
+                        <a:latin typeface="Tahoma" panose="020B0604030504040204" pitchFamily="34" charset="0"/>
+                      </a:endParaRPr>
+                    </a:p>
+                  </a:txBody>
+                  <a:tcPr marL="9525" marR="9525" marT="9525" marB="0" anchor="ctr">
+                    <a:solidFill>
+                      <a:schemeClr val="bg1">
+                        <a:lumMod val="95000"/>
+                      </a:schemeClr>
+                    </a:solidFill>
+                  </a:tcPr>
+                </a:tc>
+              </a:tr>
+            </a:tbl>
+          </a:graphicData>
+        </a:graphic>
+      </p:graphicFrame>
     </p:spTree>
     <p:extLst>
       <p:ext uri="{BB962C8B-B14F-4D97-AF65-F5344CB8AC3E}">
@@ -6260,6 +9067,18 @@
   <p:clrMapOvr>
     <a:masterClrMapping/>
   </p:clrMapOvr>
+  <mc:AlternateContent xmlns:mc="http://schemas.openxmlformats.org/markup-compatibility/2006">
+    <mc:Choice xmlns:p14="http://schemas.microsoft.com/office/powerpoint/2010/main" Requires="p14">
+      <p:transition spd="slow" p14:dur="3400">
+        <p14:reveal/>
+      </p:transition>
+    </mc:Choice>
+    <mc:Fallback>
+      <p:transition spd="slow">
+        <p:fade/>
+      </p:transition>
+    </mc:Fallback>
+  </mc:AlternateContent>
   <p:timing>
     <p:tnLst>
       <p:par>
@@ -6345,6 +9164,98 @@
           </a:p>
         </p:txBody>
       </p:sp>
+      <p:sp>
+        <p:nvSpPr>
+          <p:cNvPr id="2" name="Retângulo 1"/>
+          <p:cNvSpPr/>
+          <p:nvPr/>
+        </p:nvSpPr>
+        <p:spPr>
+          <a:xfrm>
+            <a:off x="53752" y="1268760"/>
+            <a:ext cx="9036496" cy="2677656"/>
+          </a:xfrm>
+          <a:prstGeom prst="rect">
+            <a:avLst/>
+          </a:prstGeom>
+        </p:spPr>
+        <p:txBody>
+          <a:bodyPr wrap="square">
+            <a:spAutoFit/>
+          </a:bodyPr>
+          <a:lstStyle/>
+          <a:p>
+            <a:pPr marL="803275" lvl="2" indent="-180975">
+              <a:buSzPct val="80000"/>
+              <a:buFont typeface="Wingdings" pitchFamily="2" charset="2"/>
+              <a:buChar char="§"/>
+            </a:pPr>
+            <a:r>
+              <a:rPr lang="pt-BR" sz="2400" dirty="0" smtClean="0">
+                <a:latin typeface="Tahoma" panose="020B0604030504040204" pitchFamily="34" charset="0"/>
+                <a:ea typeface="Tahoma" panose="020B0604030504040204" pitchFamily="34" charset="0"/>
+                <a:cs typeface="Tahoma" panose="020B0604030504040204" pitchFamily="34" charset="0"/>
+              </a:rPr>
+              <a:t>Como agir em equipe respeitando diferenças/pensamentos.</a:t>
+            </a:r>
+          </a:p>
+          <a:p>
+            <a:pPr marL="901700" lvl="2" indent="-279400">
+              <a:buSzPct val="80000"/>
+            </a:pPr>
+            <a:endParaRPr lang="pt-BR" sz="2400" dirty="0" smtClean="0">
+              <a:latin typeface="Tahoma" panose="020B0604030504040204" pitchFamily="34" charset="0"/>
+              <a:ea typeface="Tahoma" panose="020B0604030504040204" pitchFamily="34" charset="0"/>
+              <a:cs typeface="Tahoma" panose="020B0604030504040204" pitchFamily="34" charset="0"/>
+            </a:endParaRPr>
+          </a:p>
+          <a:p>
+            <a:pPr marL="803275" lvl="2" indent="-180975">
+              <a:buSzPct val="80000"/>
+              <a:buFont typeface="Wingdings" pitchFamily="2" charset="2"/>
+              <a:buChar char="§"/>
+            </a:pPr>
+            <a:r>
+              <a:rPr lang="pt-BR" sz="2400" dirty="0" smtClean="0">
+                <a:latin typeface="Tahoma" panose="020B0604030504040204" pitchFamily="34" charset="0"/>
+                <a:ea typeface="Tahoma" panose="020B0604030504040204" pitchFamily="34" charset="0"/>
+                <a:cs typeface="Tahoma" panose="020B0604030504040204" pitchFamily="34" charset="0"/>
+              </a:rPr>
+              <a:t>Compreensão das praticas de Gerenciamento de Projetos.</a:t>
+            </a:r>
+          </a:p>
+          <a:p>
+            <a:pPr marL="901700" lvl="2" indent="-279400">
+              <a:buSzPct val="80000"/>
+            </a:pPr>
+            <a:endParaRPr lang="pt-BR" sz="2400" dirty="0">
+              <a:latin typeface="Tahoma" panose="020B0604030504040204" pitchFamily="34" charset="0"/>
+              <a:ea typeface="Tahoma" panose="020B0604030504040204" pitchFamily="34" charset="0"/>
+              <a:cs typeface="Tahoma" panose="020B0604030504040204" pitchFamily="34" charset="0"/>
+            </a:endParaRPr>
+          </a:p>
+          <a:p>
+            <a:pPr marL="803275" lvl="2" indent="-180975">
+              <a:buSzPct val="80000"/>
+              <a:buFont typeface="Wingdings" pitchFamily="2" charset="2"/>
+              <a:buChar char="§"/>
+            </a:pPr>
+            <a:r>
+              <a:rPr lang="pt-BR" sz="2400" dirty="0" smtClean="0">
+                <a:latin typeface="Tahoma" panose="020B0604030504040204" pitchFamily="34" charset="0"/>
+                <a:ea typeface="Tahoma" panose="020B0604030504040204" pitchFamily="34" charset="0"/>
+                <a:cs typeface="Tahoma" panose="020B0604030504040204" pitchFamily="34" charset="0"/>
+              </a:rPr>
+              <a:t>Organização da equipe utilizando um cronograma e o respeitando, como se estivéssemos realmente em uma situação do dia-a-dia dentro de uma empresa.</a:t>
+            </a:r>
+            <a:endParaRPr lang="pt-BR" sz="2400" dirty="0">
+              <a:latin typeface="Tahoma" panose="020B0604030504040204" pitchFamily="34" charset="0"/>
+              <a:ea typeface="Tahoma" panose="020B0604030504040204" pitchFamily="34" charset="0"/>
+              <a:cs typeface="Tahoma" panose="020B0604030504040204" pitchFamily="34" charset="0"/>
+            </a:endParaRPr>
+          </a:p>
+        </p:txBody>
+      </p:sp>
     </p:spTree>
     <p:extLst>
       <p:ext uri="{BB962C8B-B14F-4D97-AF65-F5344CB8AC3E}">
@@ -6355,10 +9266,354 @@
   <p:clrMapOvr>
     <a:masterClrMapping/>
   </p:clrMapOvr>
+  <mc:AlternateContent xmlns:mc="http://schemas.openxmlformats.org/markup-compatibility/2006">
+    <mc:Choice xmlns:p14="http://schemas.microsoft.com/office/powerpoint/2010/main" Requires="p14">
+      <p:transition spd="slow" p14:dur="800">
+        <p:circle/>
+      </p:transition>
+    </mc:Choice>
+    <mc:Fallback>
+      <p:transition spd="slow">
+        <p:circle/>
+      </p:transition>
+    </mc:Fallback>
+  </mc:AlternateContent>
   <p:timing>
     <p:tnLst>
       <p:par>
-        <p:cTn id="1" dur="indefinite" restart="never" nodeType="tmRoot"/>
+        <p:cTn id="1" dur="indefinite" restart="never" nodeType="tmRoot">
+          <p:childTnLst>
+            <p:seq concurrent="1" nextAc="seek">
+              <p:cTn id="2" dur="indefinite" nodeType="mainSeq">
+                <p:childTnLst>
+                  <p:par>
+                    <p:cTn id="3" fill="hold">
+                      <p:stCondLst>
+                        <p:cond delay="indefinite"/>
+                      </p:stCondLst>
+                      <p:childTnLst>
+                        <p:par>
+                          <p:cTn id="4" fill="hold">
+                            <p:stCondLst>
+                              <p:cond delay="0"/>
+                            </p:stCondLst>
+                            <p:childTnLst>
+                              <p:par>
+                                <p:cTn id="5" presetID="2" presetClass="entr" presetSubtype="4" fill="hold" nodeType="clickEffect">
+                                  <p:stCondLst>
+                                    <p:cond delay="0"/>
+                                  </p:stCondLst>
+                                  <p:childTnLst>
+                                    <p:set>
+                                      <p:cBhvr>
+                                        <p:cTn id="6" dur="1" fill="hold">
+                                          <p:stCondLst>
+                                            <p:cond delay="0"/>
+                                          </p:stCondLst>
+                                        </p:cTn>
+                                        <p:tgtEl>
+                                          <p:spTgt spid="2">
+                                            <p:txEl>
+                                              <p:pRg st="0" end="0"/>
+                                            </p:txEl>
+                                          </p:spTgt>
+                                        </p:tgtEl>
+                                        <p:attrNameLst>
+                                          <p:attrName>style.visibility</p:attrName>
+                                        </p:attrNameLst>
+                                      </p:cBhvr>
+                                      <p:to>
+                                        <p:strVal val="visible"/>
+                                      </p:to>
+                                    </p:set>
+                                    <p:anim calcmode="lin" valueType="num">
+                                      <p:cBhvr additive="base">
+                                        <p:cTn id="7" dur="500" fill="hold"/>
+                                        <p:tgtEl>
+                                          <p:spTgt spid="2">
+                                            <p:txEl>
+                                              <p:pRg st="0" end="0"/>
+                                            </p:txEl>
+                                          </p:spTgt>
+                                        </p:tgtEl>
+                                        <p:attrNameLst>
+                                          <p:attrName>ppt_x</p:attrName>
+                                        </p:attrNameLst>
+                                      </p:cBhvr>
+                                      <p:tavLst>
+                                        <p:tav tm="0">
+                                          <p:val>
+                                            <p:strVal val="#ppt_x"/>
+                                          </p:val>
+                                        </p:tav>
+                                        <p:tav tm="100000">
+                                          <p:val>
+                                            <p:strVal val="#ppt_x"/>
+                                          </p:val>
+                                        </p:tav>
+                                      </p:tavLst>
+                                    </p:anim>
+                                    <p:anim calcmode="lin" valueType="num">
+                                      <p:cBhvr additive="base">
+                                        <p:cTn id="8" dur="500" fill="hold"/>
+                                        <p:tgtEl>
+                                          <p:spTgt spid="2">
+                                            <p:txEl>
+                                              <p:pRg st="0" end="0"/>
+                                            </p:txEl>
+                                          </p:spTgt>
+                                        </p:tgtEl>
+                                        <p:attrNameLst>
+                                          <p:attrName>ppt_y</p:attrName>
+                                        </p:attrNameLst>
+                                      </p:cBhvr>
+                                      <p:tavLst>
+                                        <p:tav tm="0">
+                                          <p:val>
+                                            <p:strVal val="1+#ppt_h/2"/>
+                                          </p:val>
+                                        </p:tav>
+                                        <p:tav tm="100000">
+                                          <p:val>
+                                            <p:strVal val="#ppt_y"/>
+                                          </p:val>
+                                        </p:tav>
+                                      </p:tavLst>
+                                    </p:anim>
+                                  </p:childTnLst>
+                                </p:cTn>
+                              </p:par>
+                            </p:childTnLst>
+                          </p:cTn>
+                        </p:par>
+                      </p:childTnLst>
+                    </p:cTn>
+                  </p:par>
+                  <p:par>
+                    <p:cTn id="9" fill="hold">
+                      <p:stCondLst>
+                        <p:cond delay="indefinite"/>
+                      </p:stCondLst>
+                      <p:childTnLst>
+                        <p:par>
+                          <p:cTn id="10" fill="hold">
+                            <p:stCondLst>
+                              <p:cond delay="0"/>
+                            </p:stCondLst>
+                            <p:childTnLst>
+                              <p:par>
+                                <p:cTn id="11" presetID="2" presetClass="entr" presetSubtype="4" fill="hold" nodeType="clickEffect">
+                                  <p:stCondLst>
+                                    <p:cond delay="0"/>
+                                  </p:stCondLst>
+                                  <p:childTnLst>
+                                    <p:set>
+                                      <p:cBhvr>
+                                        <p:cTn id="12" dur="1" fill="hold">
+                                          <p:stCondLst>
+                                            <p:cond delay="0"/>
+                                          </p:stCondLst>
+                                        </p:cTn>
+                                        <p:tgtEl>
+                                          <p:spTgt spid="2">
+                                            <p:txEl>
+                                              <p:pRg st="2" end="2"/>
+                                            </p:txEl>
+                                          </p:spTgt>
+                                        </p:tgtEl>
+                                        <p:attrNameLst>
+                                          <p:attrName>style.visibility</p:attrName>
+                                        </p:attrNameLst>
+                                      </p:cBhvr>
+                                      <p:to>
+                                        <p:strVal val="visible"/>
+                                      </p:to>
+                                    </p:set>
+                                    <p:anim calcmode="lin" valueType="num">
+                                      <p:cBhvr additive="base">
+                                        <p:cTn id="13" dur="500" fill="hold"/>
+                                        <p:tgtEl>
+                                          <p:spTgt spid="2">
+                                            <p:txEl>
+                                              <p:pRg st="2" end="2"/>
+                                            </p:txEl>
+                                          </p:spTgt>
+                                        </p:tgtEl>
+                                        <p:attrNameLst>
+                                          <p:attrName>ppt_x</p:attrName>
+                                        </p:attrNameLst>
+                                      </p:cBhvr>
+                                      <p:tavLst>
+                                        <p:tav tm="0">
+                                          <p:val>
+                                            <p:strVal val="#ppt_x"/>
+                                          </p:val>
+                                        </p:tav>
+                                        <p:tav tm="100000">
+                                          <p:val>
+                                            <p:strVal val="#ppt_x"/>
+                                          </p:val>
+                                        </p:tav>
+                                      </p:tavLst>
+                                    </p:anim>
+                                    <p:anim calcmode="lin" valueType="num">
+                                      <p:cBhvr additive="base">
+                                        <p:cTn id="14" dur="500" fill="hold"/>
+                                        <p:tgtEl>
+                                          <p:spTgt spid="2">
+                                            <p:txEl>
+                                              <p:pRg st="2" end="2"/>
+                                            </p:txEl>
+                                          </p:spTgt>
+                                        </p:tgtEl>
+                                        <p:attrNameLst>
+                                          <p:attrName>ppt_y</p:attrName>
+                                        </p:attrNameLst>
+                                      </p:cBhvr>
+                                      <p:tavLst>
+                                        <p:tav tm="0">
+                                          <p:val>
+                                            <p:strVal val="1+#ppt_h/2"/>
+                                          </p:val>
+                                        </p:tav>
+                                        <p:tav tm="100000">
+                                          <p:val>
+                                            <p:strVal val="#ppt_y"/>
+                                          </p:val>
+                                        </p:tav>
+                                      </p:tavLst>
+                                    </p:anim>
+                                  </p:childTnLst>
+                                </p:cTn>
+                              </p:par>
+                            </p:childTnLst>
+                          </p:cTn>
+                        </p:par>
+                      </p:childTnLst>
+                    </p:cTn>
+                  </p:par>
+                  <p:par>
+                    <p:cTn id="15" fill="hold">
+                      <p:stCondLst>
+                        <p:cond delay="indefinite"/>
+                      </p:stCondLst>
+                      <p:childTnLst>
+                        <p:par>
+                          <p:cTn id="16" fill="hold">
+                            <p:stCondLst>
+                              <p:cond delay="0"/>
+                            </p:stCondLst>
+                            <p:childTnLst>
+                              <p:par>
+                                <p:cTn id="17" presetID="2" presetClass="entr" presetSubtype="4" fill="hold" nodeType="clickEffect">
+                                  <p:stCondLst>
+                                    <p:cond delay="0"/>
+                                  </p:stCondLst>
+                                  <p:childTnLst>
+                                    <p:set>
+                                      <p:cBhvr>
+                                        <p:cTn id="18" dur="1" fill="hold">
+                                          <p:stCondLst>
+                                            <p:cond delay="0"/>
+                                          </p:stCondLst>
+                                        </p:cTn>
+                                        <p:tgtEl>
+                                          <p:spTgt spid="2">
+                                            <p:txEl>
+                                              <p:pRg st="4" end="4"/>
+                                            </p:txEl>
+                                          </p:spTgt>
+                                        </p:tgtEl>
+                                        <p:attrNameLst>
+                                          <p:attrName>style.visibility</p:attrName>
+                                        </p:attrNameLst>
+                                      </p:cBhvr>
+                                      <p:to>
+                                        <p:strVal val="visible"/>
+                                      </p:to>
+                                    </p:set>
+                                    <p:anim calcmode="lin" valueType="num">
+                                      <p:cBhvr additive="base">
+                                        <p:cTn id="19" dur="500" fill="hold"/>
+                                        <p:tgtEl>
+                                          <p:spTgt spid="2">
+                                            <p:txEl>
+                                              <p:pRg st="4" end="4"/>
+                                            </p:txEl>
+                                          </p:spTgt>
+                                        </p:tgtEl>
+                                        <p:attrNameLst>
+                                          <p:attrName>ppt_x</p:attrName>
+                                        </p:attrNameLst>
+                                      </p:cBhvr>
+                                      <p:tavLst>
+                                        <p:tav tm="0">
+                                          <p:val>
+                                            <p:strVal val="#ppt_x"/>
+                                          </p:val>
+                                        </p:tav>
+                                        <p:tav tm="100000">
+                                          <p:val>
+                                            <p:strVal val="#ppt_x"/>
+                                          </p:val>
+                                        </p:tav>
+                                      </p:tavLst>
+                                    </p:anim>
+                                    <p:anim calcmode="lin" valueType="num">
+                                      <p:cBhvr additive="base">
+                                        <p:cTn id="20" dur="500" fill="hold"/>
+                                        <p:tgtEl>
+                                          <p:spTgt spid="2">
+                                            <p:txEl>
+                                              <p:pRg st="4" end="4"/>
+                                            </p:txEl>
+                                          </p:spTgt>
+                                        </p:tgtEl>
+                                        <p:attrNameLst>
+                                          <p:attrName>ppt_y</p:attrName>
+                                        </p:attrNameLst>
+                                      </p:cBhvr>
+                                      <p:tavLst>
+                                        <p:tav tm="0">
+                                          <p:val>
+                                            <p:strVal val="1+#ppt_h/2"/>
+                                          </p:val>
+                                        </p:tav>
+                                        <p:tav tm="100000">
+                                          <p:val>
+                                            <p:strVal val="#ppt_y"/>
+                                          </p:val>
+                                        </p:tav>
+                                      </p:tavLst>
+                                    </p:anim>
+                                  </p:childTnLst>
+                                </p:cTn>
+                              </p:par>
+                            </p:childTnLst>
+                          </p:cTn>
+                        </p:par>
+                      </p:childTnLst>
+                    </p:cTn>
+                  </p:par>
+                </p:childTnLst>
+              </p:cTn>
+              <p:prevCondLst>
+                <p:cond evt="onPrev" delay="0">
+                  <p:tgtEl>
+                    <p:sldTgt/>
+                  </p:tgtEl>
+                </p:cond>
+              </p:prevCondLst>
+              <p:nextCondLst>
+                <p:cond evt="onNext" delay="0">
+                  <p:tgtEl>
+                    <p:sldTgt/>
+                  </p:tgtEl>
+                </p:cond>
+              </p:nextCondLst>
+            </p:seq>
+          </p:childTnLst>
+        </p:cTn>
       </p:par>
     </p:tnLst>
   </p:timing>

</xml_diff>